<commit_message>
Update slides with review questions for lecture.
</commit_message>
<xml_diff>
--- a/WAD/lectures/090--Introduction.to.Javascript.pptx
+++ b/WAD/lectures/090--Introduction.to.Javascript.pptx
@@ -183,7 +183,7 @@
   </p:defaultTextStyle>
   <p:extLst>
     <p:ext uri="{EFAFB233-063F-42B5-8137-9DF3F51BA10A}">
-      <p15:sldGuideLst xmlns:p15="http://schemas.microsoft.com/office/powerpoint/2012/main" xmlns="">
+      <p15:sldGuideLst xmlns="" xmlns:p15="http://schemas.microsoft.com/office/powerpoint/2012/main">
         <p15:guide id="1" orient="horz" pos="2160">
           <p15:clr>
             <a:srgbClr val="A4A3A4"/>
@@ -342,7 +342,7 @@
           </a:ln>
           <a:extLst>
             <a:ext uri="{909E8E84-426E-40DD-AFC4-6F175D3DCCD1}">
-              <a14:hiddenFill xmlns:a14="http://schemas.microsoft.com/office/drawing/2010/main" xmlns="">
+              <a14:hiddenFill xmlns="" xmlns:a14="http://schemas.microsoft.com/office/drawing/2010/main">
                 <a:solidFill>
                   <a:srgbClr val="FFFFFF"/>
                 </a:solidFill>
@@ -513,7 +513,7 @@
     </p:spTree>
     <p:extLst>
       <p:ext uri="{BB962C8B-B14F-4D97-AF65-F5344CB8AC3E}">
-        <p14:creationId xmlns:p14="http://schemas.microsoft.com/office/powerpoint/2010/main" xmlns="" val="2395374056"/>
+        <p14:creationId xmlns="" xmlns:p14="http://schemas.microsoft.com/office/powerpoint/2010/main" val="2395374056"/>
       </p:ext>
     </p:extLst>
   </p:cSld>
@@ -682,14 +682,14 @@
           <a:noFill/>
           <a:extLst>
             <a:ext uri="{909E8E84-426E-40DD-AFC4-6F175D3DCCD1}">
-              <a14:hiddenFill xmlns:a14="http://schemas.microsoft.com/office/drawing/2010/main" xmlns="">
+              <a14:hiddenFill xmlns="" xmlns:a14="http://schemas.microsoft.com/office/drawing/2010/main">
                 <a:solidFill>
                   <a:srgbClr val="FFFFFF"/>
                 </a:solidFill>
               </a14:hiddenFill>
             </a:ext>
             <a:ext uri="{91240B29-F687-4F45-9708-019B960494DF}">
-              <a14:hiddenLine xmlns:a14="http://schemas.microsoft.com/office/drawing/2010/main" xmlns="" w="9525">
+              <a14:hiddenLine xmlns="" xmlns:a14="http://schemas.microsoft.com/office/drawing/2010/main" w="9525">
                 <a:solidFill>
                   <a:srgbClr val="000000"/>
                 </a:solidFill>
@@ -841,14 +841,14 @@
           <a:noFill/>
           <a:extLst>
             <a:ext uri="{909E8E84-426E-40DD-AFC4-6F175D3DCCD1}">
-              <a14:hiddenFill xmlns:a14="http://schemas.microsoft.com/office/drawing/2010/main" xmlns="">
+              <a14:hiddenFill xmlns="" xmlns:a14="http://schemas.microsoft.com/office/drawing/2010/main">
                 <a:solidFill>
                   <a:srgbClr val="FFFFFF"/>
                 </a:solidFill>
               </a14:hiddenFill>
             </a:ext>
             <a:ext uri="{91240B29-F687-4F45-9708-019B960494DF}">
-              <a14:hiddenLine xmlns:a14="http://schemas.microsoft.com/office/drawing/2010/main" xmlns="" w="9525" cap="flat">
+              <a14:hiddenLine xmlns="" xmlns:a14="http://schemas.microsoft.com/office/drawing/2010/main" w="9525" cap="flat">
                 <a:solidFill>
                   <a:srgbClr val="000000"/>
                 </a:solidFill>
@@ -870,7 +870,7 @@
     </p:spTree>
     <p:extLst>
       <p:ext uri="{BB962C8B-B14F-4D97-AF65-F5344CB8AC3E}">
-        <p14:creationId xmlns:p14="http://schemas.microsoft.com/office/powerpoint/2010/main" xmlns="" val="388511515"/>
+        <p14:creationId xmlns="" xmlns:p14="http://schemas.microsoft.com/office/powerpoint/2010/main" val="388511515"/>
       </p:ext>
     </p:extLst>
   </p:cSld>
@@ -919,14 +919,14 @@
           <a:noFill/>
           <a:extLst>
             <a:ext uri="{909E8E84-426E-40DD-AFC4-6F175D3DCCD1}">
-              <a14:hiddenFill xmlns:a14="http://schemas.microsoft.com/office/drawing/2010/main" xmlns="">
+              <a14:hiddenFill xmlns="" xmlns:a14="http://schemas.microsoft.com/office/drawing/2010/main">
                 <a:solidFill>
                   <a:srgbClr val="FFFFFF"/>
                 </a:solidFill>
               </a14:hiddenFill>
             </a:ext>
             <a:ext uri="{91240B29-F687-4F45-9708-019B960494DF}">
-              <a14:hiddenLine xmlns:a14="http://schemas.microsoft.com/office/drawing/2010/main" xmlns="" w="9525">
+              <a14:hiddenLine xmlns="" xmlns:a14="http://schemas.microsoft.com/office/drawing/2010/main" w="9525">
                 <a:solidFill>
                   <a:srgbClr val="000000"/>
                 </a:solidFill>
@@ -1078,14 +1078,14 @@
           <a:noFill/>
           <a:extLst>
             <a:ext uri="{909E8E84-426E-40DD-AFC4-6F175D3DCCD1}">
-              <a14:hiddenFill xmlns:a14="http://schemas.microsoft.com/office/drawing/2010/main" xmlns="">
+              <a14:hiddenFill xmlns="" xmlns:a14="http://schemas.microsoft.com/office/drawing/2010/main">
                 <a:solidFill>
                   <a:srgbClr val="FFFFFF"/>
                 </a:solidFill>
               </a14:hiddenFill>
             </a:ext>
             <a:ext uri="{91240B29-F687-4F45-9708-019B960494DF}">
-              <a14:hiddenLine xmlns:a14="http://schemas.microsoft.com/office/drawing/2010/main" xmlns="" w="9525" cap="flat">
+              <a14:hiddenLine xmlns="" xmlns:a14="http://schemas.microsoft.com/office/drawing/2010/main" w="9525" cap="flat">
                 <a:solidFill>
                   <a:srgbClr val="000000"/>
                 </a:solidFill>
@@ -1107,7 +1107,7 @@
     </p:spTree>
     <p:extLst>
       <p:ext uri="{BB962C8B-B14F-4D97-AF65-F5344CB8AC3E}">
-        <p14:creationId xmlns:p14="http://schemas.microsoft.com/office/powerpoint/2010/main" xmlns="" val="1514107799"/>
+        <p14:creationId xmlns="" xmlns:p14="http://schemas.microsoft.com/office/powerpoint/2010/main" val="1514107799"/>
       </p:ext>
     </p:extLst>
   </p:cSld>
@@ -1156,14 +1156,14 @@
           <a:noFill/>
           <a:extLst>
             <a:ext uri="{909E8E84-426E-40DD-AFC4-6F175D3DCCD1}">
-              <a14:hiddenFill xmlns:a14="http://schemas.microsoft.com/office/drawing/2010/main" xmlns="">
+              <a14:hiddenFill xmlns="" xmlns:a14="http://schemas.microsoft.com/office/drawing/2010/main">
                 <a:solidFill>
                   <a:srgbClr val="FFFFFF"/>
                 </a:solidFill>
               </a14:hiddenFill>
             </a:ext>
             <a:ext uri="{91240B29-F687-4F45-9708-019B960494DF}">
-              <a14:hiddenLine xmlns:a14="http://schemas.microsoft.com/office/drawing/2010/main" xmlns="" w="9525">
+              <a14:hiddenLine xmlns="" xmlns:a14="http://schemas.microsoft.com/office/drawing/2010/main" w="9525">
                 <a:solidFill>
                   <a:srgbClr val="000000"/>
                 </a:solidFill>
@@ -1315,14 +1315,14 @@
           <a:noFill/>
           <a:extLst>
             <a:ext uri="{909E8E84-426E-40DD-AFC4-6F175D3DCCD1}">
-              <a14:hiddenFill xmlns:a14="http://schemas.microsoft.com/office/drawing/2010/main" xmlns="">
+              <a14:hiddenFill xmlns="" xmlns:a14="http://schemas.microsoft.com/office/drawing/2010/main">
                 <a:solidFill>
                   <a:srgbClr val="FFFFFF"/>
                 </a:solidFill>
               </a14:hiddenFill>
             </a:ext>
             <a:ext uri="{91240B29-F687-4F45-9708-019B960494DF}">
-              <a14:hiddenLine xmlns:a14="http://schemas.microsoft.com/office/drawing/2010/main" xmlns="" w="9525" cap="flat">
+              <a14:hiddenLine xmlns="" xmlns:a14="http://schemas.microsoft.com/office/drawing/2010/main" w="9525" cap="flat">
                 <a:solidFill>
                   <a:srgbClr val="000000"/>
                 </a:solidFill>
@@ -1344,7 +1344,7 @@
     </p:spTree>
     <p:extLst>
       <p:ext uri="{BB962C8B-B14F-4D97-AF65-F5344CB8AC3E}">
-        <p14:creationId xmlns:p14="http://schemas.microsoft.com/office/powerpoint/2010/main" xmlns="" val="4234850671"/>
+        <p14:creationId xmlns="" xmlns:p14="http://schemas.microsoft.com/office/powerpoint/2010/main" val="4234850671"/>
       </p:ext>
     </p:extLst>
   </p:cSld>
@@ -1393,14 +1393,14 @@
           <a:noFill/>
           <a:extLst>
             <a:ext uri="{909E8E84-426E-40DD-AFC4-6F175D3DCCD1}">
-              <a14:hiddenFill xmlns:a14="http://schemas.microsoft.com/office/drawing/2010/main" xmlns="">
+              <a14:hiddenFill xmlns="" xmlns:a14="http://schemas.microsoft.com/office/drawing/2010/main">
                 <a:solidFill>
                   <a:srgbClr val="FFFFFF"/>
                 </a:solidFill>
               </a14:hiddenFill>
             </a:ext>
             <a:ext uri="{91240B29-F687-4F45-9708-019B960494DF}">
-              <a14:hiddenLine xmlns:a14="http://schemas.microsoft.com/office/drawing/2010/main" xmlns="" w="9525">
+              <a14:hiddenLine xmlns="" xmlns:a14="http://schemas.microsoft.com/office/drawing/2010/main" w="9525">
                 <a:solidFill>
                   <a:srgbClr val="000000"/>
                 </a:solidFill>
@@ -1552,14 +1552,14 @@
           <a:noFill/>
           <a:extLst>
             <a:ext uri="{909E8E84-426E-40DD-AFC4-6F175D3DCCD1}">
-              <a14:hiddenFill xmlns:a14="http://schemas.microsoft.com/office/drawing/2010/main" xmlns="">
+              <a14:hiddenFill xmlns="" xmlns:a14="http://schemas.microsoft.com/office/drawing/2010/main">
                 <a:solidFill>
                   <a:srgbClr val="FFFFFF"/>
                 </a:solidFill>
               </a14:hiddenFill>
             </a:ext>
             <a:ext uri="{91240B29-F687-4F45-9708-019B960494DF}">
-              <a14:hiddenLine xmlns:a14="http://schemas.microsoft.com/office/drawing/2010/main" xmlns="" w="9525" cap="flat">
+              <a14:hiddenLine xmlns="" xmlns:a14="http://schemas.microsoft.com/office/drawing/2010/main" w="9525" cap="flat">
                 <a:solidFill>
                   <a:srgbClr val="000000"/>
                 </a:solidFill>
@@ -1581,7 +1581,7 @@
     </p:spTree>
     <p:extLst>
       <p:ext uri="{BB962C8B-B14F-4D97-AF65-F5344CB8AC3E}">
-        <p14:creationId xmlns:p14="http://schemas.microsoft.com/office/powerpoint/2010/main" xmlns="" val="1478532010"/>
+        <p14:creationId xmlns="" xmlns:p14="http://schemas.microsoft.com/office/powerpoint/2010/main" val="1478532010"/>
       </p:ext>
     </p:extLst>
   </p:cSld>
@@ -1630,14 +1630,14 @@
           <a:noFill/>
           <a:extLst>
             <a:ext uri="{909E8E84-426E-40DD-AFC4-6F175D3DCCD1}">
-              <a14:hiddenFill xmlns:a14="http://schemas.microsoft.com/office/drawing/2010/main" xmlns="">
+              <a14:hiddenFill xmlns="" xmlns:a14="http://schemas.microsoft.com/office/drawing/2010/main">
                 <a:solidFill>
                   <a:srgbClr val="FFFFFF"/>
                 </a:solidFill>
               </a14:hiddenFill>
             </a:ext>
             <a:ext uri="{91240B29-F687-4F45-9708-019B960494DF}">
-              <a14:hiddenLine xmlns:a14="http://schemas.microsoft.com/office/drawing/2010/main" xmlns="" w="9525">
+              <a14:hiddenLine xmlns="" xmlns:a14="http://schemas.microsoft.com/office/drawing/2010/main" w="9525">
                 <a:solidFill>
                   <a:srgbClr val="000000"/>
                 </a:solidFill>
@@ -1789,14 +1789,14 @@
           <a:noFill/>
           <a:extLst>
             <a:ext uri="{909E8E84-426E-40DD-AFC4-6F175D3DCCD1}">
-              <a14:hiddenFill xmlns:a14="http://schemas.microsoft.com/office/drawing/2010/main" xmlns="">
+              <a14:hiddenFill xmlns="" xmlns:a14="http://schemas.microsoft.com/office/drawing/2010/main">
                 <a:solidFill>
                   <a:srgbClr val="FFFFFF"/>
                 </a:solidFill>
               </a14:hiddenFill>
             </a:ext>
             <a:ext uri="{91240B29-F687-4F45-9708-019B960494DF}">
-              <a14:hiddenLine xmlns:a14="http://schemas.microsoft.com/office/drawing/2010/main" xmlns="" w="9525" cap="flat">
+              <a14:hiddenLine xmlns="" xmlns:a14="http://schemas.microsoft.com/office/drawing/2010/main" w="9525" cap="flat">
                 <a:solidFill>
                   <a:srgbClr val="000000"/>
                 </a:solidFill>
@@ -1818,7 +1818,7 @@
     </p:spTree>
     <p:extLst>
       <p:ext uri="{BB962C8B-B14F-4D97-AF65-F5344CB8AC3E}">
-        <p14:creationId xmlns:p14="http://schemas.microsoft.com/office/powerpoint/2010/main" xmlns="" val="3803582813"/>
+        <p14:creationId xmlns="" xmlns:p14="http://schemas.microsoft.com/office/powerpoint/2010/main" val="3803582813"/>
       </p:ext>
     </p:extLst>
   </p:cSld>
@@ -1867,14 +1867,14 @@
           <a:noFill/>
           <a:extLst>
             <a:ext uri="{909E8E84-426E-40DD-AFC4-6F175D3DCCD1}">
-              <a14:hiddenFill xmlns:a14="http://schemas.microsoft.com/office/drawing/2010/main" xmlns="">
+              <a14:hiddenFill xmlns="" xmlns:a14="http://schemas.microsoft.com/office/drawing/2010/main">
                 <a:solidFill>
                   <a:srgbClr val="FFFFFF"/>
                 </a:solidFill>
               </a14:hiddenFill>
             </a:ext>
             <a:ext uri="{91240B29-F687-4F45-9708-019B960494DF}">
-              <a14:hiddenLine xmlns:a14="http://schemas.microsoft.com/office/drawing/2010/main" xmlns="" w="9525">
+              <a14:hiddenLine xmlns="" xmlns:a14="http://schemas.microsoft.com/office/drawing/2010/main" w="9525">
                 <a:solidFill>
                   <a:srgbClr val="000000"/>
                 </a:solidFill>
@@ -2026,14 +2026,14 @@
           <a:noFill/>
           <a:extLst>
             <a:ext uri="{909E8E84-426E-40DD-AFC4-6F175D3DCCD1}">
-              <a14:hiddenFill xmlns:a14="http://schemas.microsoft.com/office/drawing/2010/main" xmlns="">
+              <a14:hiddenFill xmlns="" xmlns:a14="http://schemas.microsoft.com/office/drawing/2010/main">
                 <a:solidFill>
                   <a:srgbClr val="FFFFFF"/>
                 </a:solidFill>
               </a14:hiddenFill>
             </a:ext>
             <a:ext uri="{91240B29-F687-4F45-9708-019B960494DF}">
-              <a14:hiddenLine xmlns:a14="http://schemas.microsoft.com/office/drawing/2010/main" xmlns="" w="9525" cap="flat">
+              <a14:hiddenLine xmlns="" xmlns:a14="http://schemas.microsoft.com/office/drawing/2010/main" w="9525" cap="flat">
                 <a:solidFill>
                   <a:srgbClr val="000000"/>
                 </a:solidFill>
@@ -2055,7 +2055,7 @@
     </p:spTree>
     <p:extLst>
       <p:ext uri="{BB962C8B-B14F-4D97-AF65-F5344CB8AC3E}">
-        <p14:creationId xmlns:p14="http://schemas.microsoft.com/office/powerpoint/2010/main" xmlns="" val="1094099529"/>
+        <p14:creationId xmlns="" xmlns:p14="http://schemas.microsoft.com/office/powerpoint/2010/main" val="1094099529"/>
       </p:ext>
     </p:extLst>
   </p:cSld>
@@ -2104,14 +2104,14 @@
           <a:noFill/>
           <a:extLst>
             <a:ext uri="{909E8E84-426E-40DD-AFC4-6F175D3DCCD1}">
-              <a14:hiddenFill xmlns:a14="http://schemas.microsoft.com/office/drawing/2010/main" xmlns="">
+              <a14:hiddenFill xmlns="" xmlns:a14="http://schemas.microsoft.com/office/drawing/2010/main">
                 <a:solidFill>
                   <a:srgbClr val="FFFFFF"/>
                 </a:solidFill>
               </a14:hiddenFill>
             </a:ext>
             <a:ext uri="{91240B29-F687-4F45-9708-019B960494DF}">
-              <a14:hiddenLine xmlns:a14="http://schemas.microsoft.com/office/drawing/2010/main" xmlns="" w="9525">
+              <a14:hiddenLine xmlns="" xmlns:a14="http://schemas.microsoft.com/office/drawing/2010/main" w="9525">
                 <a:solidFill>
                   <a:srgbClr val="000000"/>
                 </a:solidFill>
@@ -2263,14 +2263,14 @@
           <a:noFill/>
           <a:extLst>
             <a:ext uri="{909E8E84-426E-40DD-AFC4-6F175D3DCCD1}">
-              <a14:hiddenFill xmlns:a14="http://schemas.microsoft.com/office/drawing/2010/main" xmlns="">
+              <a14:hiddenFill xmlns="" xmlns:a14="http://schemas.microsoft.com/office/drawing/2010/main">
                 <a:solidFill>
                   <a:srgbClr val="FFFFFF"/>
                 </a:solidFill>
               </a14:hiddenFill>
             </a:ext>
             <a:ext uri="{91240B29-F687-4F45-9708-019B960494DF}">
-              <a14:hiddenLine xmlns:a14="http://schemas.microsoft.com/office/drawing/2010/main" xmlns="" w="9525" cap="flat">
+              <a14:hiddenLine xmlns="" xmlns:a14="http://schemas.microsoft.com/office/drawing/2010/main" w="9525" cap="flat">
                 <a:solidFill>
                   <a:srgbClr val="000000"/>
                 </a:solidFill>
@@ -2292,7 +2292,7 @@
     </p:spTree>
     <p:extLst>
       <p:ext uri="{BB962C8B-B14F-4D97-AF65-F5344CB8AC3E}">
-        <p14:creationId xmlns:p14="http://schemas.microsoft.com/office/powerpoint/2010/main" xmlns="" val="2993695088"/>
+        <p14:creationId xmlns="" xmlns:p14="http://schemas.microsoft.com/office/powerpoint/2010/main" val="2993695088"/>
       </p:ext>
     </p:extLst>
   </p:cSld>
@@ -2341,14 +2341,14 @@
           <a:noFill/>
           <a:extLst>
             <a:ext uri="{909E8E84-426E-40DD-AFC4-6F175D3DCCD1}">
-              <a14:hiddenFill xmlns:a14="http://schemas.microsoft.com/office/drawing/2010/main" xmlns="">
+              <a14:hiddenFill xmlns="" xmlns:a14="http://schemas.microsoft.com/office/drawing/2010/main">
                 <a:solidFill>
                   <a:srgbClr val="FFFFFF"/>
                 </a:solidFill>
               </a14:hiddenFill>
             </a:ext>
             <a:ext uri="{91240B29-F687-4F45-9708-019B960494DF}">
-              <a14:hiddenLine xmlns:a14="http://schemas.microsoft.com/office/drawing/2010/main" xmlns="" w="9525">
+              <a14:hiddenLine xmlns="" xmlns:a14="http://schemas.microsoft.com/office/drawing/2010/main" w="9525">
                 <a:solidFill>
                   <a:srgbClr val="000000"/>
                 </a:solidFill>
@@ -2500,14 +2500,14 @@
           <a:noFill/>
           <a:extLst>
             <a:ext uri="{909E8E84-426E-40DD-AFC4-6F175D3DCCD1}">
-              <a14:hiddenFill xmlns:a14="http://schemas.microsoft.com/office/drawing/2010/main" xmlns="">
+              <a14:hiddenFill xmlns="" xmlns:a14="http://schemas.microsoft.com/office/drawing/2010/main">
                 <a:solidFill>
                   <a:srgbClr val="FFFFFF"/>
                 </a:solidFill>
               </a14:hiddenFill>
             </a:ext>
             <a:ext uri="{91240B29-F687-4F45-9708-019B960494DF}">
-              <a14:hiddenLine xmlns:a14="http://schemas.microsoft.com/office/drawing/2010/main" xmlns="" w="9525" cap="flat">
+              <a14:hiddenLine xmlns="" xmlns:a14="http://schemas.microsoft.com/office/drawing/2010/main" w="9525" cap="flat">
                 <a:solidFill>
                   <a:srgbClr val="000000"/>
                 </a:solidFill>
@@ -2529,7 +2529,7 @@
     </p:spTree>
     <p:extLst>
       <p:ext uri="{BB962C8B-B14F-4D97-AF65-F5344CB8AC3E}">
-        <p14:creationId xmlns:p14="http://schemas.microsoft.com/office/powerpoint/2010/main" xmlns="" val="4145369065"/>
+        <p14:creationId xmlns="" xmlns:p14="http://schemas.microsoft.com/office/powerpoint/2010/main" val="4145369065"/>
       </p:ext>
     </p:extLst>
   </p:cSld>
@@ -2578,14 +2578,14 @@
           <a:noFill/>
           <a:extLst>
             <a:ext uri="{909E8E84-426E-40DD-AFC4-6F175D3DCCD1}">
-              <a14:hiddenFill xmlns:a14="http://schemas.microsoft.com/office/drawing/2010/main" xmlns="">
+              <a14:hiddenFill xmlns="" xmlns:a14="http://schemas.microsoft.com/office/drawing/2010/main">
                 <a:solidFill>
                   <a:srgbClr val="FFFFFF"/>
                 </a:solidFill>
               </a14:hiddenFill>
             </a:ext>
             <a:ext uri="{91240B29-F687-4F45-9708-019B960494DF}">
-              <a14:hiddenLine xmlns:a14="http://schemas.microsoft.com/office/drawing/2010/main" xmlns="" w="9525">
+              <a14:hiddenLine xmlns="" xmlns:a14="http://schemas.microsoft.com/office/drawing/2010/main" w="9525">
                 <a:solidFill>
                   <a:srgbClr val="000000"/>
                 </a:solidFill>
@@ -2737,14 +2737,14 @@
           <a:noFill/>
           <a:extLst>
             <a:ext uri="{909E8E84-426E-40DD-AFC4-6F175D3DCCD1}">
-              <a14:hiddenFill xmlns:a14="http://schemas.microsoft.com/office/drawing/2010/main" xmlns="">
+              <a14:hiddenFill xmlns="" xmlns:a14="http://schemas.microsoft.com/office/drawing/2010/main">
                 <a:solidFill>
                   <a:srgbClr val="FFFFFF"/>
                 </a:solidFill>
               </a14:hiddenFill>
             </a:ext>
             <a:ext uri="{91240B29-F687-4F45-9708-019B960494DF}">
-              <a14:hiddenLine xmlns:a14="http://schemas.microsoft.com/office/drawing/2010/main" xmlns="" w="9525" cap="flat">
+              <a14:hiddenLine xmlns="" xmlns:a14="http://schemas.microsoft.com/office/drawing/2010/main" w="9525" cap="flat">
                 <a:solidFill>
                   <a:srgbClr val="000000"/>
                 </a:solidFill>
@@ -2766,7 +2766,7 @@
     </p:spTree>
     <p:extLst>
       <p:ext uri="{BB962C8B-B14F-4D97-AF65-F5344CB8AC3E}">
-        <p14:creationId xmlns:p14="http://schemas.microsoft.com/office/powerpoint/2010/main" xmlns="" val="2556465596"/>
+        <p14:creationId xmlns="" xmlns:p14="http://schemas.microsoft.com/office/powerpoint/2010/main" val="2556465596"/>
       </p:ext>
     </p:extLst>
   </p:cSld>
@@ -2815,14 +2815,14 @@
           <a:noFill/>
           <a:extLst>
             <a:ext uri="{909E8E84-426E-40DD-AFC4-6F175D3DCCD1}">
-              <a14:hiddenFill xmlns:a14="http://schemas.microsoft.com/office/drawing/2010/main" xmlns="">
+              <a14:hiddenFill xmlns="" xmlns:a14="http://schemas.microsoft.com/office/drawing/2010/main">
                 <a:solidFill>
                   <a:srgbClr val="FFFFFF"/>
                 </a:solidFill>
               </a14:hiddenFill>
             </a:ext>
             <a:ext uri="{91240B29-F687-4F45-9708-019B960494DF}">
-              <a14:hiddenLine xmlns:a14="http://schemas.microsoft.com/office/drawing/2010/main" xmlns="" w="9525">
+              <a14:hiddenLine xmlns="" xmlns:a14="http://schemas.microsoft.com/office/drawing/2010/main" w="9525">
                 <a:solidFill>
                   <a:srgbClr val="000000"/>
                 </a:solidFill>
@@ -2974,14 +2974,14 @@
           <a:noFill/>
           <a:extLst>
             <a:ext uri="{909E8E84-426E-40DD-AFC4-6F175D3DCCD1}">
-              <a14:hiddenFill xmlns:a14="http://schemas.microsoft.com/office/drawing/2010/main" xmlns="">
+              <a14:hiddenFill xmlns="" xmlns:a14="http://schemas.microsoft.com/office/drawing/2010/main">
                 <a:solidFill>
                   <a:srgbClr val="FFFFFF"/>
                 </a:solidFill>
               </a14:hiddenFill>
             </a:ext>
             <a:ext uri="{91240B29-F687-4F45-9708-019B960494DF}">
-              <a14:hiddenLine xmlns:a14="http://schemas.microsoft.com/office/drawing/2010/main" xmlns="" w="9525" cap="flat">
+              <a14:hiddenLine xmlns="" xmlns:a14="http://schemas.microsoft.com/office/drawing/2010/main" w="9525" cap="flat">
                 <a:solidFill>
                   <a:srgbClr val="000000"/>
                 </a:solidFill>
@@ -3003,7 +3003,7 @@
     </p:spTree>
     <p:extLst>
       <p:ext uri="{BB962C8B-B14F-4D97-AF65-F5344CB8AC3E}">
-        <p14:creationId xmlns:p14="http://schemas.microsoft.com/office/powerpoint/2010/main" xmlns="" val="706177337"/>
+        <p14:creationId xmlns="" xmlns:p14="http://schemas.microsoft.com/office/powerpoint/2010/main" val="706177337"/>
       </p:ext>
     </p:extLst>
   </p:cSld>
@@ -3052,14 +3052,14 @@
           <a:noFill/>
           <a:extLst>
             <a:ext uri="{909E8E84-426E-40DD-AFC4-6F175D3DCCD1}">
-              <a14:hiddenFill xmlns:a14="http://schemas.microsoft.com/office/drawing/2010/main" xmlns="">
+              <a14:hiddenFill xmlns="" xmlns:a14="http://schemas.microsoft.com/office/drawing/2010/main">
                 <a:solidFill>
                   <a:srgbClr val="FFFFFF"/>
                 </a:solidFill>
               </a14:hiddenFill>
             </a:ext>
             <a:ext uri="{91240B29-F687-4F45-9708-019B960494DF}">
-              <a14:hiddenLine xmlns:a14="http://schemas.microsoft.com/office/drawing/2010/main" xmlns="" w="9525">
+              <a14:hiddenLine xmlns="" xmlns:a14="http://schemas.microsoft.com/office/drawing/2010/main" w="9525">
                 <a:solidFill>
                   <a:srgbClr val="000000"/>
                 </a:solidFill>
@@ -3211,14 +3211,14 @@
           <a:noFill/>
           <a:extLst>
             <a:ext uri="{909E8E84-426E-40DD-AFC4-6F175D3DCCD1}">
-              <a14:hiddenFill xmlns:a14="http://schemas.microsoft.com/office/drawing/2010/main" xmlns="">
+              <a14:hiddenFill xmlns="" xmlns:a14="http://schemas.microsoft.com/office/drawing/2010/main">
                 <a:solidFill>
                   <a:srgbClr val="FFFFFF"/>
                 </a:solidFill>
               </a14:hiddenFill>
             </a:ext>
             <a:ext uri="{91240B29-F687-4F45-9708-019B960494DF}">
-              <a14:hiddenLine xmlns:a14="http://schemas.microsoft.com/office/drawing/2010/main" xmlns="" w="9525" cap="flat">
+              <a14:hiddenLine xmlns="" xmlns:a14="http://schemas.microsoft.com/office/drawing/2010/main" w="9525" cap="flat">
                 <a:solidFill>
                   <a:srgbClr val="000000"/>
                 </a:solidFill>
@@ -3240,7 +3240,7 @@
     </p:spTree>
     <p:extLst>
       <p:ext uri="{BB962C8B-B14F-4D97-AF65-F5344CB8AC3E}">
-        <p14:creationId xmlns:p14="http://schemas.microsoft.com/office/powerpoint/2010/main" xmlns="" val="2328323395"/>
+        <p14:creationId xmlns="" xmlns:p14="http://schemas.microsoft.com/office/powerpoint/2010/main" val="2328323395"/>
       </p:ext>
     </p:extLst>
   </p:cSld>
@@ -3289,14 +3289,14 @@
           <a:noFill/>
           <a:extLst>
             <a:ext uri="{909E8E84-426E-40DD-AFC4-6F175D3DCCD1}">
-              <a14:hiddenFill xmlns:a14="http://schemas.microsoft.com/office/drawing/2010/main" xmlns="">
+              <a14:hiddenFill xmlns="" xmlns:a14="http://schemas.microsoft.com/office/drawing/2010/main">
                 <a:solidFill>
                   <a:srgbClr val="FFFFFF"/>
                 </a:solidFill>
               </a14:hiddenFill>
             </a:ext>
             <a:ext uri="{91240B29-F687-4F45-9708-019B960494DF}">
-              <a14:hiddenLine xmlns:a14="http://schemas.microsoft.com/office/drawing/2010/main" xmlns="" w="9525">
+              <a14:hiddenLine xmlns="" xmlns:a14="http://schemas.microsoft.com/office/drawing/2010/main" w="9525">
                 <a:solidFill>
                   <a:srgbClr val="000000"/>
                 </a:solidFill>
@@ -3456,14 +3456,14 @@
           <a:noFill/>
           <a:extLst>
             <a:ext uri="{909E8E84-426E-40DD-AFC4-6F175D3DCCD1}">
-              <a14:hiddenFill xmlns:a14="http://schemas.microsoft.com/office/drawing/2010/main" xmlns="">
+              <a14:hiddenFill xmlns="" xmlns:a14="http://schemas.microsoft.com/office/drawing/2010/main">
                 <a:solidFill>
                   <a:srgbClr val="FFFFFF"/>
                 </a:solidFill>
               </a14:hiddenFill>
             </a:ext>
             <a:ext uri="{91240B29-F687-4F45-9708-019B960494DF}">
-              <a14:hiddenLine xmlns:a14="http://schemas.microsoft.com/office/drawing/2010/main" xmlns="" w="9525" cap="flat">
+              <a14:hiddenLine xmlns="" xmlns:a14="http://schemas.microsoft.com/office/drawing/2010/main" w="9525" cap="flat">
                 <a:solidFill>
                   <a:srgbClr val="000000"/>
                 </a:solidFill>
@@ -3485,7 +3485,7 @@
     </p:spTree>
     <p:extLst>
       <p:ext uri="{BB962C8B-B14F-4D97-AF65-F5344CB8AC3E}">
-        <p14:creationId xmlns:p14="http://schemas.microsoft.com/office/powerpoint/2010/main" xmlns="" val="567212851"/>
+        <p14:creationId xmlns="" xmlns:p14="http://schemas.microsoft.com/office/powerpoint/2010/main" val="567212851"/>
       </p:ext>
     </p:extLst>
   </p:cSld>
@@ -3534,14 +3534,14 @@
           <a:noFill/>
           <a:extLst>
             <a:ext uri="{909E8E84-426E-40DD-AFC4-6F175D3DCCD1}">
-              <a14:hiddenFill xmlns:a14="http://schemas.microsoft.com/office/drawing/2010/main" xmlns="">
+              <a14:hiddenFill xmlns="" xmlns:a14="http://schemas.microsoft.com/office/drawing/2010/main">
                 <a:solidFill>
                   <a:srgbClr val="FFFFFF"/>
                 </a:solidFill>
               </a14:hiddenFill>
             </a:ext>
             <a:ext uri="{91240B29-F687-4F45-9708-019B960494DF}">
-              <a14:hiddenLine xmlns:a14="http://schemas.microsoft.com/office/drawing/2010/main" xmlns="" w="9525">
+              <a14:hiddenLine xmlns="" xmlns:a14="http://schemas.microsoft.com/office/drawing/2010/main" w="9525">
                 <a:solidFill>
                   <a:srgbClr val="000000"/>
                 </a:solidFill>
@@ -3693,14 +3693,14 @@
           <a:noFill/>
           <a:extLst>
             <a:ext uri="{909E8E84-426E-40DD-AFC4-6F175D3DCCD1}">
-              <a14:hiddenFill xmlns:a14="http://schemas.microsoft.com/office/drawing/2010/main" xmlns="">
+              <a14:hiddenFill xmlns="" xmlns:a14="http://schemas.microsoft.com/office/drawing/2010/main">
                 <a:solidFill>
                   <a:srgbClr val="FFFFFF"/>
                 </a:solidFill>
               </a14:hiddenFill>
             </a:ext>
             <a:ext uri="{91240B29-F687-4F45-9708-019B960494DF}">
-              <a14:hiddenLine xmlns:a14="http://schemas.microsoft.com/office/drawing/2010/main" xmlns="" w="9525" cap="flat">
+              <a14:hiddenLine xmlns="" xmlns:a14="http://schemas.microsoft.com/office/drawing/2010/main" w="9525" cap="flat">
                 <a:solidFill>
                   <a:srgbClr val="000000"/>
                 </a:solidFill>
@@ -3722,7 +3722,7 @@
     </p:spTree>
     <p:extLst>
       <p:ext uri="{BB962C8B-B14F-4D97-AF65-F5344CB8AC3E}">
-        <p14:creationId xmlns:p14="http://schemas.microsoft.com/office/powerpoint/2010/main" xmlns="" val="1727569112"/>
+        <p14:creationId xmlns="" xmlns:p14="http://schemas.microsoft.com/office/powerpoint/2010/main" val="1727569112"/>
       </p:ext>
     </p:extLst>
   </p:cSld>
@@ -3771,14 +3771,14 @@
           <a:noFill/>
           <a:extLst>
             <a:ext uri="{909E8E84-426E-40DD-AFC4-6F175D3DCCD1}">
-              <a14:hiddenFill xmlns:a14="http://schemas.microsoft.com/office/drawing/2010/main" xmlns="">
+              <a14:hiddenFill xmlns="" xmlns:a14="http://schemas.microsoft.com/office/drawing/2010/main">
                 <a:solidFill>
                   <a:srgbClr val="FFFFFF"/>
                 </a:solidFill>
               </a14:hiddenFill>
             </a:ext>
             <a:ext uri="{91240B29-F687-4F45-9708-019B960494DF}">
-              <a14:hiddenLine xmlns:a14="http://schemas.microsoft.com/office/drawing/2010/main" xmlns="" w="9525">
+              <a14:hiddenLine xmlns="" xmlns:a14="http://schemas.microsoft.com/office/drawing/2010/main" w="9525">
                 <a:solidFill>
                   <a:srgbClr val="000000"/>
                 </a:solidFill>
@@ -3930,14 +3930,14 @@
           <a:noFill/>
           <a:extLst>
             <a:ext uri="{909E8E84-426E-40DD-AFC4-6F175D3DCCD1}">
-              <a14:hiddenFill xmlns:a14="http://schemas.microsoft.com/office/drawing/2010/main" xmlns="">
+              <a14:hiddenFill xmlns="" xmlns:a14="http://schemas.microsoft.com/office/drawing/2010/main">
                 <a:solidFill>
                   <a:srgbClr val="FFFFFF"/>
                 </a:solidFill>
               </a14:hiddenFill>
             </a:ext>
             <a:ext uri="{91240B29-F687-4F45-9708-019B960494DF}">
-              <a14:hiddenLine xmlns:a14="http://schemas.microsoft.com/office/drawing/2010/main" xmlns="" w="9525" cap="flat">
+              <a14:hiddenLine xmlns="" xmlns:a14="http://schemas.microsoft.com/office/drawing/2010/main" w="9525" cap="flat">
                 <a:solidFill>
                   <a:srgbClr val="000000"/>
                 </a:solidFill>
@@ -3959,7 +3959,7 @@
     </p:spTree>
     <p:extLst>
       <p:ext uri="{BB962C8B-B14F-4D97-AF65-F5344CB8AC3E}">
-        <p14:creationId xmlns:p14="http://schemas.microsoft.com/office/powerpoint/2010/main" xmlns="" val="274565703"/>
+        <p14:creationId xmlns="" xmlns:p14="http://schemas.microsoft.com/office/powerpoint/2010/main" val="274565703"/>
       </p:ext>
     </p:extLst>
   </p:cSld>
@@ -4008,14 +4008,14 @@
           <a:noFill/>
           <a:extLst>
             <a:ext uri="{909E8E84-426E-40DD-AFC4-6F175D3DCCD1}">
-              <a14:hiddenFill xmlns:a14="http://schemas.microsoft.com/office/drawing/2010/main" xmlns="">
+              <a14:hiddenFill xmlns="" xmlns:a14="http://schemas.microsoft.com/office/drawing/2010/main">
                 <a:solidFill>
                   <a:srgbClr val="FFFFFF"/>
                 </a:solidFill>
               </a14:hiddenFill>
             </a:ext>
             <a:ext uri="{91240B29-F687-4F45-9708-019B960494DF}">
-              <a14:hiddenLine xmlns:a14="http://schemas.microsoft.com/office/drawing/2010/main" xmlns="" w="9525">
+              <a14:hiddenLine xmlns="" xmlns:a14="http://schemas.microsoft.com/office/drawing/2010/main" w="9525">
                 <a:solidFill>
                   <a:srgbClr val="000000"/>
                 </a:solidFill>
@@ -4167,14 +4167,14 @@
           <a:noFill/>
           <a:extLst>
             <a:ext uri="{909E8E84-426E-40DD-AFC4-6F175D3DCCD1}">
-              <a14:hiddenFill xmlns:a14="http://schemas.microsoft.com/office/drawing/2010/main" xmlns="">
+              <a14:hiddenFill xmlns="" xmlns:a14="http://schemas.microsoft.com/office/drawing/2010/main">
                 <a:solidFill>
                   <a:srgbClr val="FFFFFF"/>
                 </a:solidFill>
               </a14:hiddenFill>
             </a:ext>
             <a:ext uri="{91240B29-F687-4F45-9708-019B960494DF}">
-              <a14:hiddenLine xmlns:a14="http://schemas.microsoft.com/office/drawing/2010/main" xmlns="" w="9525" cap="flat">
+              <a14:hiddenLine xmlns="" xmlns:a14="http://schemas.microsoft.com/office/drawing/2010/main" w="9525" cap="flat">
                 <a:solidFill>
                   <a:srgbClr val="000000"/>
                 </a:solidFill>
@@ -4196,7 +4196,7 @@
     </p:spTree>
     <p:extLst>
       <p:ext uri="{BB962C8B-B14F-4D97-AF65-F5344CB8AC3E}">
-        <p14:creationId xmlns:p14="http://schemas.microsoft.com/office/powerpoint/2010/main" xmlns="" val="3595201039"/>
+        <p14:creationId xmlns="" xmlns:p14="http://schemas.microsoft.com/office/powerpoint/2010/main" val="3595201039"/>
       </p:ext>
     </p:extLst>
   </p:cSld>
@@ -4245,14 +4245,14 @@
           <a:noFill/>
           <a:extLst>
             <a:ext uri="{909E8E84-426E-40DD-AFC4-6F175D3DCCD1}">
-              <a14:hiddenFill xmlns:a14="http://schemas.microsoft.com/office/drawing/2010/main" xmlns="">
+              <a14:hiddenFill xmlns="" xmlns:a14="http://schemas.microsoft.com/office/drawing/2010/main">
                 <a:solidFill>
                   <a:srgbClr val="FFFFFF"/>
                 </a:solidFill>
               </a14:hiddenFill>
             </a:ext>
             <a:ext uri="{91240B29-F687-4F45-9708-019B960494DF}">
-              <a14:hiddenLine xmlns:a14="http://schemas.microsoft.com/office/drawing/2010/main" xmlns="" w="9525">
+              <a14:hiddenLine xmlns="" xmlns:a14="http://schemas.microsoft.com/office/drawing/2010/main" w="9525">
                 <a:solidFill>
                   <a:srgbClr val="000000"/>
                 </a:solidFill>
@@ -4404,14 +4404,14 @@
           <a:noFill/>
           <a:extLst>
             <a:ext uri="{909E8E84-426E-40DD-AFC4-6F175D3DCCD1}">
-              <a14:hiddenFill xmlns:a14="http://schemas.microsoft.com/office/drawing/2010/main" xmlns="">
+              <a14:hiddenFill xmlns="" xmlns:a14="http://schemas.microsoft.com/office/drawing/2010/main">
                 <a:solidFill>
                   <a:srgbClr val="FFFFFF"/>
                 </a:solidFill>
               </a14:hiddenFill>
             </a:ext>
             <a:ext uri="{91240B29-F687-4F45-9708-019B960494DF}">
-              <a14:hiddenLine xmlns:a14="http://schemas.microsoft.com/office/drawing/2010/main" xmlns="" w="9525" cap="flat">
+              <a14:hiddenLine xmlns="" xmlns:a14="http://schemas.microsoft.com/office/drawing/2010/main" w="9525" cap="flat">
                 <a:solidFill>
                   <a:srgbClr val="000000"/>
                 </a:solidFill>
@@ -4433,7 +4433,7 @@
     </p:spTree>
     <p:extLst>
       <p:ext uri="{BB962C8B-B14F-4D97-AF65-F5344CB8AC3E}">
-        <p14:creationId xmlns:p14="http://schemas.microsoft.com/office/powerpoint/2010/main" xmlns="" val="964031603"/>
+        <p14:creationId xmlns="" xmlns:p14="http://schemas.microsoft.com/office/powerpoint/2010/main" val="964031603"/>
       </p:ext>
     </p:extLst>
   </p:cSld>
@@ -4482,14 +4482,14 @@
           <a:noFill/>
           <a:extLst>
             <a:ext uri="{909E8E84-426E-40DD-AFC4-6F175D3DCCD1}">
-              <a14:hiddenFill xmlns:a14="http://schemas.microsoft.com/office/drawing/2010/main" xmlns="">
+              <a14:hiddenFill xmlns="" xmlns:a14="http://schemas.microsoft.com/office/drawing/2010/main">
                 <a:solidFill>
                   <a:srgbClr val="FFFFFF"/>
                 </a:solidFill>
               </a14:hiddenFill>
             </a:ext>
             <a:ext uri="{91240B29-F687-4F45-9708-019B960494DF}">
-              <a14:hiddenLine xmlns:a14="http://schemas.microsoft.com/office/drawing/2010/main" xmlns="" w="9525">
+              <a14:hiddenLine xmlns="" xmlns:a14="http://schemas.microsoft.com/office/drawing/2010/main" w="9525">
                 <a:solidFill>
                   <a:srgbClr val="000000"/>
                 </a:solidFill>
@@ -4641,14 +4641,14 @@
           <a:noFill/>
           <a:extLst>
             <a:ext uri="{909E8E84-426E-40DD-AFC4-6F175D3DCCD1}">
-              <a14:hiddenFill xmlns:a14="http://schemas.microsoft.com/office/drawing/2010/main" xmlns="">
+              <a14:hiddenFill xmlns="" xmlns:a14="http://schemas.microsoft.com/office/drawing/2010/main">
                 <a:solidFill>
                   <a:srgbClr val="FFFFFF"/>
                 </a:solidFill>
               </a14:hiddenFill>
             </a:ext>
             <a:ext uri="{91240B29-F687-4F45-9708-019B960494DF}">
-              <a14:hiddenLine xmlns:a14="http://schemas.microsoft.com/office/drawing/2010/main" xmlns="" w="9525" cap="flat">
+              <a14:hiddenLine xmlns="" xmlns:a14="http://schemas.microsoft.com/office/drawing/2010/main" w="9525" cap="flat">
                 <a:solidFill>
                   <a:srgbClr val="000000"/>
                 </a:solidFill>
@@ -4670,7 +4670,7 @@
     </p:spTree>
     <p:extLst>
       <p:ext uri="{BB962C8B-B14F-4D97-AF65-F5344CB8AC3E}">
-        <p14:creationId xmlns:p14="http://schemas.microsoft.com/office/powerpoint/2010/main" xmlns="" val="3026785298"/>
+        <p14:creationId xmlns="" xmlns:p14="http://schemas.microsoft.com/office/powerpoint/2010/main" val="3026785298"/>
       </p:ext>
     </p:extLst>
   </p:cSld>
@@ -4797,7 +4797,7 @@
     </p:spTree>
     <p:extLst>
       <p:ext uri="{BB962C8B-B14F-4D97-AF65-F5344CB8AC3E}">
-        <p14:creationId xmlns:p14="http://schemas.microsoft.com/office/powerpoint/2010/main" xmlns="" val="4194925875"/>
+        <p14:creationId xmlns="" xmlns:p14="http://schemas.microsoft.com/office/powerpoint/2010/main" val="4194925875"/>
       </p:ext>
     </p:extLst>
   </p:cSld>
@@ -4934,7 +4934,7 @@
               <a:pPr>
                 <a:defRPr/>
               </a:pPr>
-              <a:t>11/23/2017</a:t>
+              <a:t>12/18/2017</a:t>
             </a:fld>
             <a:endParaRPr lang="en-US" altLang="en-US"/>
           </a:p>
@@ -5020,7 +5020,7 @@
     </p:spTree>
     <p:extLst>
       <p:ext uri="{BB962C8B-B14F-4D97-AF65-F5344CB8AC3E}">
-        <p14:creationId xmlns:p14="http://schemas.microsoft.com/office/powerpoint/2010/main" xmlns="" val="1741164192"/>
+        <p14:creationId xmlns="" xmlns:p14="http://schemas.microsoft.com/office/powerpoint/2010/main" val="1741164192"/>
       </p:ext>
     </p:extLst>
   </p:cSld>
@@ -5167,7 +5167,7 @@
               <a:pPr>
                 <a:defRPr/>
               </a:pPr>
-              <a:t>11/23/2017</a:t>
+              <a:t>12/18/2017</a:t>
             </a:fld>
             <a:endParaRPr lang="en-US" altLang="en-US"/>
           </a:p>
@@ -5253,7 +5253,7 @@
     </p:spTree>
     <p:extLst>
       <p:ext uri="{BB962C8B-B14F-4D97-AF65-F5344CB8AC3E}">
-        <p14:creationId xmlns:p14="http://schemas.microsoft.com/office/powerpoint/2010/main" xmlns="" val="2866338608"/>
+        <p14:creationId xmlns="" xmlns:p14="http://schemas.microsoft.com/office/powerpoint/2010/main" val="2866338608"/>
       </p:ext>
     </p:extLst>
   </p:cSld>
@@ -5358,7 +5358,7 @@
     </p:spTree>
     <p:extLst>
       <p:ext uri="{BB962C8B-B14F-4D97-AF65-F5344CB8AC3E}">
-        <p14:creationId xmlns:p14="http://schemas.microsoft.com/office/powerpoint/2010/main" xmlns="" val="2725100791"/>
+        <p14:creationId xmlns="" xmlns:p14="http://schemas.microsoft.com/office/powerpoint/2010/main" val="2725100791"/>
       </p:ext>
     </p:extLst>
   </p:cSld>
@@ -5485,7 +5485,7 @@
     </p:spTree>
     <p:extLst>
       <p:ext uri="{BB962C8B-B14F-4D97-AF65-F5344CB8AC3E}">
-        <p14:creationId xmlns:p14="http://schemas.microsoft.com/office/powerpoint/2010/main" xmlns="" val="694531350"/>
+        <p14:creationId xmlns="" xmlns:p14="http://schemas.microsoft.com/office/powerpoint/2010/main" val="694531350"/>
       </p:ext>
     </p:extLst>
   </p:cSld>
@@ -5652,7 +5652,7 @@
     </p:spTree>
     <p:extLst>
       <p:ext uri="{BB962C8B-B14F-4D97-AF65-F5344CB8AC3E}">
-        <p14:creationId xmlns:p14="http://schemas.microsoft.com/office/powerpoint/2010/main" xmlns="" val="1298835224"/>
+        <p14:creationId xmlns="" xmlns:p14="http://schemas.microsoft.com/office/powerpoint/2010/main" val="1298835224"/>
       </p:ext>
     </p:extLst>
   </p:cSld>
@@ -5954,7 +5954,7 @@
     </p:spTree>
     <p:extLst>
       <p:ext uri="{BB962C8B-B14F-4D97-AF65-F5344CB8AC3E}">
-        <p14:creationId xmlns:p14="http://schemas.microsoft.com/office/powerpoint/2010/main" xmlns="" val="2682297746"/>
+        <p14:creationId xmlns="" xmlns:p14="http://schemas.microsoft.com/office/powerpoint/2010/main" val="2682297746"/>
       </p:ext>
     </p:extLst>
   </p:cSld>
@@ -6039,7 +6039,7 @@
               <a:pPr>
                 <a:defRPr/>
               </a:pPr>
-              <a:t>11/23/2017</a:t>
+              <a:t>12/18/2017</a:t>
             </a:fld>
             <a:endParaRPr lang="en-US" altLang="en-US"/>
           </a:p>
@@ -6125,7 +6125,7 @@
     </p:spTree>
     <p:extLst>
       <p:ext uri="{BB962C8B-B14F-4D97-AF65-F5344CB8AC3E}">
-        <p14:creationId xmlns:p14="http://schemas.microsoft.com/office/powerpoint/2010/main" xmlns="" val="2927876315"/>
+        <p14:creationId xmlns="" xmlns:p14="http://schemas.microsoft.com/office/powerpoint/2010/main" val="2927876315"/>
       </p:ext>
     </p:extLst>
   </p:cSld>
@@ -6187,7 +6187,7 @@
               <a:pPr>
                 <a:defRPr/>
               </a:pPr>
-              <a:t>11/23/2017</a:t>
+              <a:t>12/18/2017</a:t>
             </a:fld>
             <a:endParaRPr lang="en-US" altLang="en-US"/>
           </a:p>
@@ -6273,7 +6273,7 @@
     </p:spTree>
     <p:extLst>
       <p:ext uri="{BB962C8B-B14F-4D97-AF65-F5344CB8AC3E}">
-        <p14:creationId xmlns:p14="http://schemas.microsoft.com/office/powerpoint/2010/main" xmlns="" val="3238583012"/>
+        <p14:creationId xmlns="" xmlns:p14="http://schemas.microsoft.com/office/powerpoint/2010/main" val="3238583012"/>
       </p:ext>
     </p:extLst>
   </p:cSld>
@@ -6517,7 +6517,7 @@
               <a:pPr>
                 <a:defRPr/>
               </a:pPr>
-              <a:t>11/23/2017</a:t>
+              <a:t>12/18/2017</a:t>
             </a:fld>
             <a:endParaRPr lang="en-US" altLang="en-US"/>
           </a:p>
@@ -6603,7 +6603,7 @@
     </p:spTree>
     <p:extLst>
       <p:ext uri="{BB962C8B-B14F-4D97-AF65-F5344CB8AC3E}">
-        <p14:creationId xmlns:p14="http://schemas.microsoft.com/office/powerpoint/2010/main" xmlns="" val="1520447279"/>
+        <p14:creationId xmlns="" xmlns:p14="http://schemas.microsoft.com/office/powerpoint/2010/main" val="1520447279"/>
       </p:ext>
     </p:extLst>
   </p:cSld>
@@ -6824,7 +6824,7 @@
               <a:pPr>
                 <a:defRPr/>
               </a:pPr>
-              <a:t>11/23/2017</a:t>
+              <a:t>12/18/2017</a:t>
             </a:fld>
             <a:endParaRPr lang="en-US" altLang="en-US"/>
           </a:p>
@@ -6910,7 +6910,7 @@
     </p:spTree>
     <p:extLst>
       <p:ext uri="{BB962C8B-B14F-4D97-AF65-F5344CB8AC3E}">
-        <p14:creationId xmlns:p14="http://schemas.microsoft.com/office/powerpoint/2010/main" xmlns="" val="17182400"/>
+        <p14:creationId xmlns="" xmlns:p14="http://schemas.microsoft.com/office/powerpoint/2010/main" val="17182400"/>
       </p:ext>
     </p:extLst>
   </p:cSld>
@@ -6969,14 +6969,14 @@
           </a:ln>
           <a:extLst>
             <a:ext uri="{909E8E84-426E-40DD-AFC4-6F175D3DCCD1}">
-              <a14:hiddenFill xmlns:a14="http://schemas.microsoft.com/office/drawing/2010/main" xmlns="">
+              <a14:hiddenFill xmlns="" xmlns:a14="http://schemas.microsoft.com/office/drawing/2010/main">
                 <a:solidFill>
                   <a:srgbClr val="FFFFFF"/>
                 </a:solidFill>
               </a14:hiddenFill>
             </a:ext>
             <a:ext uri="{91240B29-F687-4F45-9708-019B960494DF}">
-              <a14:hiddenLine xmlns:a14="http://schemas.microsoft.com/office/drawing/2010/main" xmlns="" w="9525">
+              <a14:hiddenLine xmlns="" xmlns:a14="http://schemas.microsoft.com/office/drawing/2010/main" w="9525">
                 <a:solidFill>
                   <a:srgbClr val="000000"/>
                 </a:solidFill>
@@ -7027,14 +7027,14 @@
           </a:ln>
           <a:extLst>
             <a:ext uri="{909E8E84-426E-40DD-AFC4-6F175D3DCCD1}">
-              <a14:hiddenFill xmlns:a14="http://schemas.microsoft.com/office/drawing/2010/main" xmlns="">
+              <a14:hiddenFill xmlns="" xmlns:a14="http://schemas.microsoft.com/office/drawing/2010/main">
                 <a:solidFill>
                   <a:srgbClr val="FFFFFF"/>
                 </a:solidFill>
               </a14:hiddenFill>
             </a:ext>
             <a:ext uri="{91240B29-F687-4F45-9708-019B960494DF}">
-              <a14:hiddenLine xmlns:a14="http://schemas.microsoft.com/office/drawing/2010/main" xmlns="" w="9525">
+              <a14:hiddenLine xmlns="" xmlns:a14="http://schemas.microsoft.com/office/drawing/2010/main" w="9525">
                 <a:solidFill>
                   <a:srgbClr val="000000"/>
                 </a:solidFill>
@@ -7537,14 +7537,14 @@
           </a:ln>
           <a:extLst>
             <a:ext uri="{909E8E84-426E-40DD-AFC4-6F175D3DCCD1}">
-              <a14:hiddenFill xmlns:a14="http://schemas.microsoft.com/office/drawing/2010/main" xmlns="">
+              <a14:hiddenFill xmlns="" xmlns:a14="http://schemas.microsoft.com/office/drawing/2010/main">
                 <a:solidFill>
                   <a:srgbClr val="FFFFFF"/>
                 </a:solidFill>
               </a14:hiddenFill>
             </a:ext>
             <a:ext uri="{91240B29-F687-4F45-9708-019B960494DF}">
-              <a14:hiddenLine xmlns:a14="http://schemas.microsoft.com/office/drawing/2010/main" xmlns="" w="9525">
+              <a14:hiddenLine xmlns="" xmlns:a14="http://schemas.microsoft.com/office/drawing/2010/main" w="9525">
                 <a:solidFill>
                   <a:srgbClr val="000000"/>
                 </a:solidFill>
@@ -7817,14 +7817,14 @@
           </a:ln>
           <a:extLst>
             <a:ext uri="{909E8E84-426E-40DD-AFC4-6F175D3DCCD1}">
-              <a14:hiddenFill xmlns:a14="http://schemas.microsoft.com/office/drawing/2010/main" xmlns="">
+              <a14:hiddenFill xmlns="" xmlns:a14="http://schemas.microsoft.com/office/drawing/2010/main">
                 <a:solidFill>
                   <a:srgbClr val="FFFFFF"/>
                 </a:solidFill>
               </a14:hiddenFill>
             </a:ext>
             <a:ext uri="{91240B29-F687-4F45-9708-019B960494DF}">
-              <a14:hiddenLine xmlns:a14="http://schemas.microsoft.com/office/drawing/2010/main" xmlns="" w="9525">
+              <a14:hiddenLine xmlns="" xmlns:a14="http://schemas.microsoft.com/office/drawing/2010/main" w="9525">
                 <a:solidFill>
                   <a:srgbClr val="000000"/>
                 </a:solidFill>
@@ -8101,14 +8101,14 @@
           </a:ln>
           <a:extLst>
             <a:ext uri="{909E8E84-426E-40DD-AFC4-6F175D3DCCD1}">
-              <a14:hiddenFill xmlns:a14="http://schemas.microsoft.com/office/drawing/2010/main" xmlns="">
+              <a14:hiddenFill xmlns="" xmlns:a14="http://schemas.microsoft.com/office/drawing/2010/main">
                 <a:solidFill>
                   <a:srgbClr val="FFFFFF"/>
                 </a:solidFill>
               </a14:hiddenFill>
             </a:ext>
             <a:ext uri="{91240B29-F687-4F45-9708-019B960494DF}">
-              <a14:hiddenLine xmlns:a14="http://schemas.microsoft.com/office/drawing/2010/main" xmlns="" w="9525">
+              <a14:hiddenLine xmlns="" xmlns:a14="http://schemas.microsoft.com/office/drawing/2010/main" w="9525">
                 <a:solidFill>
                   <a:srgbClr val="000000"/>
                 </a:solidFill>
@@ -8434,14 +8434,14 @@
           </a:ln>
           <a:extLst>
             <a:ext uri="{909E8E84-426E-40DD-AFC4-6F175D3DCCD1}">
-              <a14:hiddenFill xmlns:a14="http://schemas.microsoft.com/office/drawing/2010/main" xmlns="">
+              <a14:hiddenFill xmlns="" xmlns:a14="http://schemas.microsoft.com/office/drawing/2010/main">
                 <a:solidFill>
                   <a:srgbClr val="FFFFFF"/>
                 </a:solidFill>
               </a14:hiddenFill>
             </a:ext>
             <a:ext uri="{91240B29-F687-4F45-9708-019B960494DF}">
-              <a14:hiddenLine xmlns:a14="http://schemas.microsoft.com/office/drawing/2010/main" xmlns="" w="9525">
+              <a14:hiddenLine xmlns="" xmlns:a14="http://schemas.microsoft.com/office/drawing/2010/main" w="9525">
                 <a:solidFill>
                   <a:srgbClr val="000000"/>
                 </a:solidFill>
@@ -8720,14 +8720,14 @@
           </a:ln>
           <a:extLst>
             <a:ext uri="{909E8E84-426E-40DD-AFC4-6F175D3DCCD1}">
-              <a14:hiddenFill xmlns:a14="http://schemas.microsoft.com/office/drawing/2010/main" xmlns="">
+              <a14:hiddenFill xmlns="" xmlns:a14="http://schemas.microsoft.com/office/drawing/2010/main">
                 <a:solidFill>
                   <a:srgbClr val="FFFFFF"/>
                 </a:solidFill>
               </a14:hiddenFill>
             </a:ext>
             <a:ext uri="{91240B29-F687-4F45-9708-019B960494DF}">
-              <a14:hiddenLine xmlns:a14="http://schemas.microsoft.com/office/drawing/2010/main" xmlns="" w="9525">
+              <a14:hiddenLine xmlns="" xmlns:a14="http://schemas.microsoft.com/office/drawing/2010/main" w="9525">
                 <a:solidFill>
                   <a:srgbClr val="000000"/>
                 </a:solidFill>
@@ -9457,14 +9457,14 @@
           </a:ln>
           <a:extLst>
             <a:ext uri="{909E8E84-426E-40DD-AFC4-6F175D3DCCD1}">
-              <a14:hiddenFill xmlns:a14="http://schemas.microsoft.com/office/drawing/2010/main" xmlns="">
+              <a14:hiddenFill xmlns="" xmlns:a14="http://schemas.microsoft.com/office/drawing/2010/main">
                 <a:solidFill>
                   <a:srgbClr val="FFFFFF"/>
                 </a:solidFill>
               </a14:hiddenFill>
             </a:ext>
             <a:ext uri="{91240B29-F687-4F45-9708-019B960494DF}">
-              <a14:hiddenLine xmlns:a14="http://schemas.microsoft.com/office/drawing/2010/main" xmlns="" w="9525">
+              <a14:hiddenLine xmlns="" xmlns:a14="http://schemas.microsoft.com/office/drawing/2010/main" w="9525">
                 <a:solidFill>
                   <a:srgbClr val="000000"/>
                 </a:solidFill>
@@ -10324,14 +10324,14 @@
           </a:ln>
           <a:extLst>
             <a:ext uri="{909E8E84-426E-40DD-AFC4-6F175D3DCCD1}">
-              <a14:hiddenFill xmlns:a14="http://schemas.microsoft.com/office/drawing/2010/main" xmlns="">
+              <a14:hiddenFill xmlns="" xmlns:a14="http://schemas.microsoft.com/office/drawing/2010/main">
                 <a:solidFill>
                   <a:srgbClr val="FFFFFF"/>
                 </a:solidFill>
               </a14:hiddenFill>
             </a:ext>
             <a:ext uri="{91240B29-F687-4F45-9708-019B960494DF}">
-              <a14:hiddenLine xmlns:a14="http://schemas.microsoft.com/office/drawing/2010/main" xmlns="" w="9525">
+              <a14:hiddenLine xmlns="" xmlns:a14="http://schemas.microsoft.com/office/drawing/2010/main" w="9525">
                 <a:solidFill>
                   <a:srgbClr val="000000"/>
                 </a:solidFill>
@@ -10675,7 +10675,7 @@
           <a:blip r:embed="rId2" cstate="print">
             <a:extLst>
               <a:ext uri="{28A0092B-C50C-407E-A947-70E740481C1C}">
-                <a14:useLocalDpi xmlns:a14="http://schemas.microsoft.com/office/drawing/2010/main" xmlns="" val="0"/>
+                <a14:useLocalDpi xmlns="" xmlns:a14="http://schemas.microsoft.com/office/drawing/2010/main" val="0"/>
               </a:ext>
             </a:extLst>
           </a:blip>
@@ -10698,14 +10698,14 @@
           </a:ln>
           <a:extLst>
             <a:ext uri="{909E8E84-426E-40DD-AFC4-6F175D3DCCD1}">
-              <a14:hiddenFill xmlns:a14="http://schemas.microsoft.com/office/drawing/2010/main" xmlns="">
+              <a14:hiddenFill xmlns="" xmlns:a14="http://schemas.microsoft.com/office/drawing/2010/main">
                 <a:solidFill>
                   <a:srgbClr val="FFFFFF"/>
                 </a:solidFill>
               </a14:hiddenFill>
             </a:ext>
             <a:ext uri="{91240B29-F687-4F45-9708-019B960494DF}">
-              <a14:hiddenLine xmlns:a14="http://schemas.microsoft.com/office/drawing/2010/main" xmlns="" w="9525">
+              <a14:hiddenLine xmlns="" xmlns:a14="http://schemas.microsoft.com/office/drawing/2010/main" w="9525">
                 <a:solidFill>
                   <a:srgbClr val="000000"/>
                 </a:solidFill>
@@ -11006,7 +11006,7 @@
           <a:blip r:embed="rId2" cstate="print">
             <a:extLst>
               <a:ext uri="{28A0092B-C50C-407E-A947-70E740481C1C}">
-                <a14:useLocalDpi xmlns:a14="http://schemas.microsoft.com/office/drawing/2010/main" xmlns="" val="0"/>
+                <a14:useLocalDpi xmlns="" xmlns:a14="http://schemas.microsoft.com/office/drawing/2010/main" val="0"/>
               </a:ext>
             </a:extLst>
           </a:blip>
@@ -11029,14 +11029,14 @@
           </a:ln>
           <a:extLst>
             <a:ext uri="{909E8E84-426E-40DD-AFC4-6F175D3DCCD1}">
-              <a14:hiddenFill xmlns:a14="http://schemas.microsoft.com/office/drawing/2010/main" xmlns="">
+              <a14:hiddenFill xmlns="" xmlns:a14="http://schemas.microsoft.com/office/drawing/2010/main">
                 <a:solidFill>
                   <a:srgbClr val="FFFFFF"/>
                 </a:solidFill>
               </a14:hiddenFill>
             </a:ext>
             <a:ext uri="{91240B29-F687-4F45-9708-019B960494DF}">
-              <a14:hiddenLine xmlns:a14="http://schemas.microsoft.com/office/drawing/2010/main" xmlns="" w="9525">
+              <a14:hiddenLine xmlns="" xmlns:a14="http://schemas.microsoft.com/office/drawing/2010/main" w="9525">
                 <a:solidFill>
                   <a:srgbClr val="000000"/>
                 </a:solidFill>
@@ -11060,7 +11060,7 @@
           <a:blip r:embed="rId3" cstate="print">
             <a:extLst>
               <a:ext uri="{28A0092B-C50C-407E-A947-70E740481C1C}">
-                <a14:useLocalDpi xmlns:a14="http://schemas.microsoft.com/office/drawing/2010/main" xmlns="" val="0"/>
+                <a14:useLocalDpi xmlns="" xmlns:a14="http://schemas.microsoft.com/office/drawing/2010/main" val="0"/>
               </a:ext>
             </a:extLst>
           </a:blip>
@@ -11083,14 +11083,14 @@
           </a:ln>
           <a:extLst>
             <a:ext uri="{909E8E84-426E-40DD-AFC4-6F175D3DCCD1}">
-              <a14:hiddenFill xmlns:a14="http://schemas.microsoft.com/office/drawing/2010/main" xmlns="">
+              <a14:hiddenFill xmlns="" xmlns:a14="http://schemas.microsoft.com/office/drawing/2010/main">
                 <a:solidFill>
                   <a:srgbClr val="FFFFFF"/>
                 </a:solidFill>
               </a14:hiddenFill>
             </a:ext>
             <a:ext uri="{91240B29-F687-4F45-9708-019B960494DF}">
-              <a14:hiddenLine xmlns:a14="http://schemas.microsoft.com/office/drawing/2010/main" xmlns="" w="9525">
+              <a14:hiddenLine xmlns="" xmlns:a14="http://schemas.microsoft.com/office/drawing/2010/main" w="9525">
                 <a:solidFill>
                   <a:srgbClr val="000000"/>
                 </a:solidFill>
@@ -11234,7 +11234,7 @@
           <a:blip r:embed="rId3" cstate="print">
             <a:extLst>
               <a:ext uri="{28A0092B-C50C-407E-A947-70E740481C1C}">
-                <a14:useLocalDpi xmlns:a14="http://schemas.microsoft.com/office/drawing/2010/main" xmlns="" val="0"/>
+                <a14:useLocalDpi xmlns="" xmlns:a14="http://schemas.microsoft.com/office/drawing/2010/main" val="0"/>
               </a:ext>
             </a:extLst>
           </a:blip>
@@ -11257,14 +11257,14 @@
           </a:ln>
           <a:extLst>
             <a:ext uri="{909E8E84-426E-40DD-AFC4-6F175D3DCCD1}">
-              <a14:hiddenFill xmlns:a14="http://schemas.microsoft.com/office/drawing/2010/main" xmlns="">
+              <a14:hiddenFill xmlns="" xmlns:a14="http://schemas.microsoft.com/office/drawing/2010/main">
                 <a:solidFill>
                   <a:srgbClr val="FFFFFF"/>
                 </a:solidFill>
               </a14:hiddenFill>
             </a:ext>
             <a:ext uri="{91240B29-F687-4F45-9708-019B960494DF}">
-              <a14:hiddenLine xmlns:a14="http://schemas.microsoft.com/office/drawing/2010/main" xmlns="" w="9525">
+              <a14:hiddenLine xmlns="" xmlns:a14="http://schemas.microsoft.com/office/drawing/2010/main" w="9525">
                 <a:solidFill>
                   <a:srgbClr val="000000"/>
                 </a:solidFill>
@@ -11288,7 +11288,7 @@
           <a:blip r:embed="rId4" cstate="print">
             <a:extLst>
               <a:ext uri="{28A0092B-C50C-407E-A947-70E740481C1C}">
-                <a14:useLocalDpi xmlns:a14="http://schemas.microsoft.com/office/drawing/2010/main" xmlns="" val="0"/>
+                <a14:useLocalDpi xmlns="" xmlns:a14="http://schemas.microsoft.com/office/drawing/2010/main" val="0"/>
               </a:ext>
             </a:extLst>
           </a:blip>
@@ -11311,14 +11311,14 @@
           </a:ln>
           <a:extLst>
             <a:ext uri="{909E8E84-426E-40DD-AFC4-6F175D3DCCD1}">
-              <a14:hiddenFill xmlns:a14="http://schemas.microsoft.com/office/drawing/2010/main" xmlns="">
+              <a14:hiddenFill xmlns="" xmlns:a14="http://schemas.microsoft.com/office/drawing/2010/main">
                 <a:solidFill>
                   <a:srgbClr val="FFFFFF"/>
                 </a:solidFill>
               </a14:hiddenFill>
             </a:ext>
             <a:ext uri="{91240B29-F687-4F45-9708-019B960494DF}">
-              <a14:hiddenLine xmlns:a14="http://schemas.microsoft.com/office/drawing/2010/main" xmlns="" w="9525">
+              <a14:hiddenLine xmlns="" xmlns:a14="http://schemas.microsoft.com/office/drawing/2010/main" w="9525">
                 <a:solidFill>
                   <a:srgbClr val="000000"/>
                 </a:solidFill>
@@ -11687,7 +11687,7 @@
           <a:blip r:embed="rId4" cstate="print">
             <a:extLst>
               <a:ext uri="{28A0092B-C50C-407E-A947-70E740481C1C}">
-                <a14:useLocalDpi xmlns:a14="http://schemas.microsoft.com/office/drawing/2010/main" xmlns="" val="0"/>
+                <a14:useLocalDpi xmlns="" xmlns:a14="http://schemas.microsoft.com/office/drawing/2010/main" val="0"/>
               </a:ext>
             </a:extLst>
           </a:blip>
@@ -11710,14 +11710,14 @@
           </a:ln>
           <a:extLst>
             <a:ext uri="{909E8E84-426E-40DD-AFC4-6F175D3DCCD1}">
-              <a14:hiddenFill xmlns:a14="http://schemas.microsoft.com/office/drawing/2010/main" xmlns="">
+              <a14:hiddenFill xmlns="" xmlns:a14="http://schemas.microsoft.com/office/drawing/2010/main">
                 <a:solidFill>
                   <a:srgbClr val="FFFFFF"/>
                 </a:solidFill>
               </a14:hiddenFill>
             </a:ext>
             <a:ext uri="{91240B29-F687-4F45-9708-019B960494DF}">
-              <a14:hiddenLine xmlns:a14="http://schemas.microsoft.com/office/drawing/2010/main" xmlns="" w="9525">
+              <a14:hiddenLine xmlns="" xmlns:a14="http://schemas.microsoft.com/office/drawing/2010/main" w="9525">
                 <a:solidFill>
                   <a:srgbClr val="000000"/>
                 </a:solidFill>
@@ -11940,7 +11940,7 @@
     </p:spTree>
     <p:extLst>
       <p:ext uri="{BB962C8B-B14F-4D97-AF65-F5344CB8AC3E}">
-        <p14:creationId xmlns:p14="http://schemas.microsoft.com/office/powerpoint/2010/main" xmlns="" val="4247796886"/>
+        <p14:creationId xmlns="" xmlns:p14="http://schemas.microsoft.com/office/powerpoint/2010/main" val="4247796886"/>
       </p:ext>
     </p:extLst>
   </p:cSld>
@@ -12376,7 +12376,7 @@
           <a:blip r:embed="rId4" cstate="print">
             <a:extLst>
               <a:ext uri="{28A0092B-C50C-407E-A947-70E740481C1C}">
-                <a14:useLocalDpi xmlns:a14="http://schemas.microsoft.com/office/drawing/2010/main" xmlns="" val="0"/>
+                <a14:useLocalDpi xmlns="" xmlns:a14="http://schemas.microsoft.com/office/drawing/2010/main" val="0"/>
               </a:ext>
             </a:extLst>
           </a:blip>
@@ -12399,14 +12399,14 @@
           </a:ln>
           <a:extLst>
             <a:ext uri="{909E8E84-426E-40DD-AFC4-6F175D3DCCD1}">
-              <a14:hiddenFill xmlns:a14="http://schemas.microsoft.com/office/drawing/2010/main" xmlns="">
+              <a14:hiddenFill xmlns="" xmlns:a14="http://schemas.microsoft.com/office/drawing/2010/main">
                 <a:solidFill>
                   <a:srgbClr val="FFFFFF"/>
                 </a:solidFill>
               </a14:hiddenFill>
             </a:ext>
             <a:ext uri="{91240B29-F687-4F45-9708-019B960494DF}">
-              <a14:hiddenLine xmlns:a14="http://schemas.microsoft.com/office/drawing/2010/main" xmlns="" w="9525">
+              <a14:hiddenLine xmlns="" xmlns:a14="http://schemas.microsoft.com/office/drawing/2010/main" w="9525">
                 <a:solidFill>
                   <a:srgbClr val="000000"/>
                 </a:solidFill>
@@ -12562,7 +12562,7 @@
           <a:blip r:embed="rId4" cstate="print">
             <a:extLst>
               <a:ext uri="{28A0092B-C50C-407E-A947-70E740481C1C}">
-                <a14:useLocalDpi xmlns:a14="http://schemas.microsoft.com/office/drawing/2010/main" xmlns="" val="0"/>
+                <a14:useLocalDpi xmlns="" xmlns:a14="http://schemas.microsoft.com/office/drawing/2010/main" val="0"/>
               </a:ext>
             </a:extLst>
           </a:blip>
@@ -12585,14 +12585,14 @@
           </a:ln>
           <a:extLst>
             <a:ext uri="{909E8E84-426E-40DD-AFC4-6F175D3DCCD1}">
-              <a14:hiddenFill xmlns:a14="http://schemas.microsoft.com/office/drawing/2010/main" xmlns="">
+              <a14:hiddenFill xmlns="" xmlns:a14="http://schemas.microsoft.com/office/drawing/2010/main">
                 <a:solidFill>
                   <a:srgbClr val="FFFFFF"/>
                 </a:solidFill>
               </a14:hiddenFill>
             </a:ext>
             <a:ext uri="{91240B29-F687-4F45-9708-019B960494DF}">
-              <a14:hiddenLine xmlns:a14="http://schemas.microsoft.com/office/drawing/2010/main" xmlns="" w="9525">
+              <a14:hiddenLine xmlns="" xmlns:a14="http://schemas.microsoft.com/office/drawing/2010/main" w="9525">
                 <a:solidFill>
                   <a:srgbClr val="000000"/>
                 </a:solidFill>
@@ -12616,7 +12616,7 @@
           <a:blip r:embed="rId5" cstate="print">
             <a:extLst>
               <a:ext uri="{28A0092B-C50C-407E-A947-70E740481C1C}">
-                <a14:useLocalDpi xmlns:a14="http://schemas.microsoft.com/office/drawing/2010/main" xmlns="" val="0"/>
+                <a14:useLocalDpi xmlns="" xmlns:a14="http://schemas.microsoft.com/office/drawing/2010/main" val="0"/>
               </a:ext>
             </a:extLst>
           </a:blip>
@@ -12639,14 +12639,14 @@
           </a:ln>
           <a:extLst>
             <a:ext uri="{909E8E84-426E-40DD-AFC4-6F175D3DCCD1}">
-              <a14:hiddenFill xmlns:a14="http://schemas.microsoft.com/office/drawing/2010/main" xmlns="">
+              <a14:hiddenFill xmlns="" xmlns:a14="http://schemas.microsoft.com/office/drawing/2010/main">
                 <a:solidFill>
                   <a:srgbClr val="FFFFFF"/>
                 </a:solidFill>
               </a14:hiddenFill>
             </a:ext>
             <a:ext uri="{91240B29-F687-4F45-9708-019B960494DF}">
-              <a14:hiddenLine xmlns:a14="http://schemas.microsoft.com/office/drawing/2010/main" xmlns="" w="9525">
+              <a14:hiddenLine xmlns="" xmlns:a14="http://schemas.microsoft.com/office/drawing/2010/main" w="9525">
                 <a:solidFill>
                   <a:srgbClr val="000000"/>
                 </a:solidFill>
@@ -12780,7 +12780,7 @@
           <a:blip r:embed="rId3" cstate="print">
             <a:extLst>
               <a:ext uri="{28A0092B-C50C-407E-A947-70E740481C1C}">
-                <a14:useLocalDpi xmlns:a14="http://schemas.microsoft.com/office/drawing/2010/main" xmlns="" val="0"/>
+                <a14:useLocalDpi xmlns="" xmlns:a14="http://schemas.microsoft.com/office/drawing/2010/main" val="0"/>
               </a:ext>
             </a:extLst>
           </a:blip>
@@ -12803,14 +12803,14 @@
           </a:ln>
           <a:extLst>
             <a:ext uri="{909E8E84-426E-40DD-AFC4-6F175D3DCCD1}">
-              <a14:hiddenFill xmlns:a14="http://schemas.microsoft.com/office/drawing/2010/main" xmlns="">
+              <a14:hiddenFill xmlns="" xmlns:a14="http://schemas.microsoft.com/office/drawing/2010/main">
                 <a:solidFill>
                   <a:srgbClr val="FFFFFF"/>
                 </a:solidFill>
               </a14:hiddenFill>
             </a:ext>
             <a:ext uri="{91240B29-F687-4F45-9708-019B960494DF}">
-              <a14:hiddenLine xmlns:a14="http://schemas.microsoft.com/office/drawing/2010/main" xmlns="" w="9525">
+              <a14:hiddenLine xmlns="" xmlns:a14="http://schemas.microsoft.com/office/drawing/2010/main" w="9525">
                 <a:solidFill>
                   <a:srgbClr val="000000"/>
                 </a:solidFill>
@@ -12834,7 +12834,7 @@
           <a:blip r:embed="rId4" cstate="print">
             <a:extLst>
               <a:ext uri="{28A0092B-C50C-407E-A947-70E740481C1C}">
-                <a14:useLocalDpi xmlns:a14="http://schemas.microsoft.com/office/drawing/2010/main" xmlns="" val="0"/>
+                <a14:useLocalDpi xmlns="" xmlns:a14="http://schemas.microsoft.com/office/drawing/2010/main" val="0"/>
               </a:ext>
             </a:extLst>
           </a:blip>
@@ -12857,14 +12857,14 @@
           </a:ln>
           <a:extLst>
             <a:ext uri="{909E8E84-426E-40DD-AFC4-6F175D3DCCD1}">
-              <a14:hiddenFill xmlns:a14="http://schemas.microsoft.com/office/drawing/2010/main" xmlns="">
+              <a14:hiddenFill xmlns="" xmlns:a14="http://schemas.microsoft.com/office/drawing/2010/main">
                 <a:solidFill>
                   <a:srgbClr val="FFFFFF"/>
                 </a:solidFill>
               </a14:hiddenFill>
             </a:ext>
             <a:ext uri="{91240B29-F687-4F45-9708-019B960494DF}">
-              <a14:hiddenLine xmlns:a14="http://schemas.microsoft.com/office/drawing/2010/main" xmlns="" w="9525">
+              <a14:hiddenLine xmlns="" xmlns:a14="http://schemas.microsoft.com/office/drawing/2010/main" w="9525">
                 <a:solidFill>
                   <a:srgbClr val="000000"/>
                 </a:solidFill>
@@ -12941,7 +12941,7 @@
           <a:blip r:embed="rId3" cstate="print">
             <a:extLst>
               <a:ext uri="{28A0092B-C50C-407E-A947-70E740481C1C}">
-                <a14:useLocalDpi xmlns:a14="http://schemas.microsoft.com/office/drawing/2010/main" xmlns="" val="0"/>
+                <a14:useLocalDpi xmlns="" xmlns:a14="http://schemas.microsoft.com/office/drawing/2010/main" val="0"/>
               </a:ext>
             </a:extLst>
           </a:blip>
@@ -12964,14 +12964,14 @@
           </a:ln>
           <a:extLst>
             <a:ext uri="{909E8E84-426E-40DD-AFC4-6F175D3DCCD1}">
-              <a14:hiddenFill xmlns:a14="http://schemas.microsoft.com/office/drawing/2010/main" xmlns="">
+              <a14:hiddenFill xmlns="" xmlns:a14="http://schemas.microsoft.com/office/drawing/2010/main">
                 <a:solidFill>
                   <a:srgbClr val="FFFFFF"/>
                 </a:solidFill>
               </a14:hiddenFill>
             </a:ext>
             <a:ext uri="{91240B29-F687-4F45-9708-019B960494DF}">
-              <a14:hiddenLine xmlns:a14="http://schemas.microsoft.com/office/drawing/2010/main" xmlns="" w="9525">
+              <a14:hiddenLine xmlns="" xmlns:a14="http://schemas.microsoft.com/office/drawing/2010/main" w="9525">
                 <a:solidFill>
                   <a:srgbClr val="000000"/>
                 </a:solidFill>
@@ -13038,7 +13038,7 @@
           <a:blip r:embed="rId4" cstate="print">
             <a:extLst>
               <a:ext uri="{28A0092B-C50C-407E-A947-70E740481C1C}">
-                <a14:useLocalDpi xmlns:a14="http://schemas.microsoft.com/office/drawing/2010/main" xmlns="" val="0"/>
+                <a14:useLocalDpi xmlns="" xmlns:a14="http://schemas.microsoft.com/office/drawing/2010/main" val="0"/>
               </a:ext>
             </a:extLst>
           </a:blip>
@@ -13061,14 +13061,14 @@
           </a:ln>
           <a:extLst>
             <a:ext uri="{909E8E84-426E-40DD-AFC4-6F175D3DCCD1}">
-              <a14:hiddenFill xmlns:a14="http://schemas.microsoft.com/office/drawing/2010/main" xmlns="">
+              <a14:hiddenFill xmlns="" xmlns:a14="http://schemas.microsoft.com/office/drawing/2010/main">
                 <a:solidFill>
                   <a:srgbClr val="FFFFFF"/>
                 </a:solidFill>
               </a14:hiddenFill>
             </a:ext>
             <a:ext uri="{91240B29-F687-4F45-9708-019B960494DF}">
-              <a14:hiddenLine xmlns:a14="http://schemas.microsoft.com/office/drawing/2010/main" xmlns="" w="9525">
+              <a14:hiddenLine xmlns="" xmlns:a14="http://schemas.microsoft.com/office/drawing/2010/main" w="9525">
                 <a:solidFill>
                   <a:srgbClr val="000000"/>
                 </a:solidFill>
@@ -13266,7 +13266,7 @@
           <a:blip r:embed="rId2" cstate="print">
             <a:extLst>
               <a:ext uri="{28A0092B-C50C-407E-A947-70E740481C1C}">
-                <a14:useLocalDpi xmlns:a14="http://schemas.microsoft.com/office/drawing/2010/main" xmlns="" val="0"/>
+                <a14:useLocalDpi xmlns="" xmlns:a14="http://schemas.microsoft.com/office/drawing/2010/main" val="0"/>
               </a:ext>
             </a:extLst>
           </a:blip>
@@ -13289,14 +13289,14 @@
           </a:ln>
           <a:extLst>
             <a:ext uri="{909E8E84-426E-40DD-AFC4-6F175D3DCCD1}">
-              <a14:hiddenFill xmlns:a14="http://schemas.microsoft.com/office/drawing/2010/main" xmlns="">
+              <a14:hiddenFill xmlns="" xmlns:a14="http://schemas.microsoft.com/office/drawing/2010/main">
                 <a:solidFill>
                   <a:srgbClr val="FFFFFF"/>
                 </a:solidFill>
               </a14:hiddenFill>
             </a:ext>
             <a:ext uri="{91240B29-F687-4F45-9708-019B960494DF}">
-              <a14:hiddenLine xmlns:a14="http://schemas.microsoft.com/office/drawing/2010/main" xmlns="" w="9525">
+              <a14:hiddenLine xmlns="" xmlns:a14="http://schemas.microsoft.com/office/drawing/2010/main" w="9525">
                 <a:solidFill>
                   <a:srgbClr val="000000"/>
                 </a:solidFill>
@@ -13345,7 +13345,7 @@
           <a:blip r:embed="rId3" cstate="print">
             <a:extLst>
               <a:ext uri="{28A0092B-C50C-407E-A947-70E740481C1C}">
-                <a14:useLocalDpi xmlns:a14="http://schemas.microsoft.com/office/drawing/2010/main" xmlns="" val="0"/>
+                <a14:useLocalDpi xmlns="" xmlns:a14="http://schemas.microsoft.com/office/drawing/2010/main" val="0"/>
               </a:ext>
             </a:extLst>
           </a:blip>
@@ -13368,14 +13368,14 @@
           </a:ln>
           <a:extLst>
             <a:ext uri="{909E8E84-426E-40DD-AFC4-6F175D3DCCD1}">
-              <a14:hiddenFill xmlns:a14="http://schemas.microsoft.com/office/drawing/2010/main" xmlns="">
+              <a14:hiddenFill xmlns="" xmlns:a14="http://schemas.microsoft.com/office/drawing/2010/main">
                 <a:solidFill>
                   <a:srgbClr val="FFFFFF"/>
                 </a:solidFill>
               </a14:hiddenFill>
             </a:ext>
             <a:ext uri="{91240B29-F687-4F45-9708-019B960494DF}">
-              <a14:hiddenLine xmlns:a14="http://schemas.microsoft.com/office/drawing/2010/main" xmlns="" w="9525">
+              <a14:hiddenLine xmlns="" xmlns:a14="http://schemas.microsoft.com/office/drawing/2010/main" w="9525">
                 <a:solidFill>
                   <a:srgbClr val="000000"/>
                 </a:solidFill>
@@ -13461,7 +13461,7 @@
           <a:blip r:embed="rId4" cstate="print">
             <a:extLst>
               <a:ext uri="{28A0092B-C50C-407E-A947-70E740481C1C}">
-                <a14:useLocalDpi xmlns:a14="http://schemas.microsoft.com/office/drawing/2010/main" xmlns="" val="0"/>
+                <a14:useLocalDpi xmlns="" xmlns:a14="http://schemas.microsoft.com/office/drawing/2010/main" val="0"/>
               </a:ext>
             </a:extLst>
           </a:blip>
@@ -13484,14 +13484,14 @@
           </a:ln>
           <a:extLst>
             <a:ext uri="{909E8E84-426E-40DD-AFC4-6F175D3DCCD1}">
-              <a14:hiddenFill xmlns:a14="http://schemas.microsoft.com/office/drawing/2010/main" xmlns="">
+              <a14:hiddenFill xmlns="" xmlns:a14="http://schemas.microsoft.com/office/drawing/2010/main">
                 <a:solidFill>
                   <a:srgbClr val="FFFFFF"/>
                 </a:solidFill>
               </a14:hiddenFill>
             </a:ext>
             <a:ext uri="{91240B29-F687-4F45-9708-019B960494DF}">
-              <a14:hiddenLine xmlns:a14="http://schemas.microsoft.com/office/drawing/2010/main" xmlns="" w="9525">
+              <a14:hiddenLine xmlns="" xmlns:a14="http://schemas.microsoft.com/office/drawing/2010/main" w="9525">
                 <a:solidFill>
                   <a:srgbClr val="000000"/>
                 </a:solidFill>
@@ -13578,14 +13578,14 @@
           </a:ln>
           <a:extLst>
             <a:ext uri="{909E8E84-426E-40DD-AFC4-6F175D3DCCD1}">
-              <a14:hiddenFill xmlns:a14="http://schemas.microsoft.com/office/drawing/2010/main" xmlns="">
+              <a14:hiddenFill xmlns="" xmlns:a14="http://schemas.microsoft.com/office/drawing/2010/main">
                 <a:solidFill>
                   <a:srgbClr val="FFFFFF"/>
                 </a:solidFill>
               </a14:hiddenFill>
             </a:ext>
             <a:ext uri="{91240B29-F687-4F45-9708-019B960494DF}">
-              <a14:hiddenLine xmlns:a14="http://schemas.microsoft.com/office/drawing/2010/main" xmlns="" w="9525">
+              <a14:hiddenLine xmlns="" xmlns:a14="http://schemas.microsoft.com/office/drawing/2010/main" w="9525">
                 <a:solidFill>
                   <a:srgbClr val="000000"/>
                 </a:solidFill>
@@ -13858,14 +13858,14 @@
           </a:ln>
           <a:extLst>
             <a:ext uri="{909E8E84-426E-40DD-AFC4-6F175D3DCCD1}">
-              <a14:hiddenFill xmlns:a14="http://schemas.microsoft.com/office/drawing/2010/main" xmlns="">
+              <a14:hiddenFill xmlns="" xmlns:a14="http://schemas.microsoft.com/office/drawing/2010/main">
                 <a:solidFill>
                   <a:srgbClr val="FFFFFF"/>
                 </a:solidFill>
               </a14:hiddenFill>
             </a:ext>
             <a:ext uri="{91240B29-F687-4F45-9708-019B960494DF}">
-              <a14:hiddenLine xmlns:a14="http://schemas.microsoft.com/office/drawing/2010/main" xmlns="" w="9525">
+              <a14:hiddenLine xmlns="" xmlns:a14="http://schemas.microsoft.com/office/drawing/2010/main" w="9525">
                 <a:solidFill>
                   <a:srgbClr val="000000"/>
                 </a:solidFill>
@@ -14411,7 +14411,7 @@
           <a:blip r:embed="rId3" cstate="print">
             <a:extLst>
               <a:ext uri="{28A0092B-C50C-407E-A947-70E740481C1C}">
-                <a14:useLocalDpi xmlns:a14="http://schemas.microsoft.com/office/drawing/2010/main" xmlns="" val="0"/>
+                <a14:useLocalDpi xmlns="" xmlns:a14="http://schemas.microsoft.com/office/drawing/2010/main" val="0"/>
               </a:ext>
             </a:extLst>
           </a:blip>
@@ -14434,14 +14434,14 @@
           </a:ln>
           <a:extLst>
             <a:ext uri="{909E8E84-426E-40DD-AFC4-6F175D3DCCD1}">
-              <a14:hiddenFill xmlns:a14="http://schemas.microsoft.com/office/drawing/2010/main" xmlns="">
+              <a14:hiddenFill xmlns="" xmlns:a14="http://schemas.microsoft.com/office/drawing/2010/main">
                 <a:solidFill>
                   <a:srgbClr val="FFFFFF"/>
                 </a:solidFill>
               </a14:hiddenFill>
             </a:ext>
             <a:ext uri="{91240B29-F687-4F45-9708-019B960494DF}">
-              <a14:hiddenLine xmlns:a14="http://schemas.microsoft.com/office/drawing/2010/main" xmlns="" w="9525">
+              <a14:hiddenLine xmlns="" xmlns:a14="http://schemas.microsoft.com/office/drawing/2010/main" w="9525">
                 <a:solidFill>
                   <a:srgbClr val="000000"/>
                 </a:solidFill>
@@ -14465,7 +14465,7 @@
           <a:blip r:embed="rId4" cstate="print">
             <a:extLst>
               <a:ext uri="{28A0092B-C50C-407E-A947-70E740481C1C}">
-                <a14:useLocalDpi xmlns:a14="http://schemas.microsoft.com/office/drawing/2010/main" xmlns="" val="0"/>
+                <a14:useLocalDpi xmlns="" xmlns:a14="http://schemas.microsoft.com/office/drawing/2010/main" val="0"/>
               </a:ext>
             </a:extLst>
           </a:blip>
@@ -14488,14 +14488,14 @@
           </a:ln>
           <a:extLst>
             <a:ext uri="{909E8E84-426E-40DD-AFC4-6F175D3DCCD1}">
-              <a14:hiddenFill xmlns:a14="http://schemas.microsoft.com/office/drawing/2010/main" xmlns="">
+              <a14:hiddenFill xmlns="" xmlns:a14="http://schemas.microsoft.com/office/drawing/2010/main">
                 <a:solidFill>
                   <a:srgbClr val="FFFFFF"/>
                 </a:solidFill>
               </a14:hiddenFill>
             </a:ext>
             <a:ext uri="{91240B29-F687-4F45-9708-019B960494DF}">
-              <a14:hiddenLine xmlns:a14="http://schemas.microsoft.com/office/drawing/2010/main" xmlns="" w="9525">
+              <a14:hiddenLine xmlns="" xmlns:a14="http://schemas.microsoft.com/office/drawing/2010/main" w="9525">
                 <a:solidFill>
                   <a:srgbClr val="000000"/>
                 </a:solidFill>
@@ -14629,7 +14629,7 @@
           <a:blip r:embed="rId3" cstate="print">
             <a:extLst>
               <a:ext uri="{28A0092B-C50C-407E-A947-70E740481C1C}">
-                <a14:useLocalDpi xmlns:a14="http://schemas.microsoft.com/office/drawing/2010/main" xmlns="" val="0"/>
+                <a14:useLocalDpi xmlns="" xmlns:a14="http://schemas.microsoft.com/office/drawing/2010/main" val="0"/>
               </a:ext>
             </a:extLst>
           </a:blip>
@@ -14652,14 +14652,14 @@
           </a:ln>
           <a:extLst>
             <a:ext uri="{909E8E84-426E-40DD-AFC4-6F175D3DCCD1}">
-              <a14:hiddenFill xmlns:a14="http://schemas.microsoft.com/office/drawing/2010/main" xmlns="">
+              <a14:hiddenFill xmlns="" xmlns:a14="http://schemas.microsoft.com/office/drawing/2010/main">
                 <a:solidFill>
                   <a:srgbClr val="FFFFFF"/>
                 </a:solidFill>
               </a14:hiddenFill>
             </a:ext>
             <a:ext uri="{91240B29-F687-4F45-9708-019B960494DF}">
-              <a14:hiddenLine xmlns:a14="http://schemas.microsoft.com/office/drawing/2010/main" xmlns="" w="9525">
+              <a14:hiddenLine xmlns="" xmlns:a14="http://schemas.microsoft.com/office/drawing/2010/main" w="9525">
                 <a:solidFill>
                   <a:srgbClr val="000000"/>
                 </a:solidFill>
@@ -14683,7 +14683,7 @@
           <a:blip r:embed="rId4" cstate="print">
             <a:extLst>
               <a:ext uri="{28A0092B-C50C-407E-A947-70E740481C1C}">
-                <a14:useLocalDpi xmlns:a14="http://schemas.microsoft.com/office/drawing/2010/main" xmlns="" val="0"/>
+                <a14:useLocalDpi xmlns="" xmlns:a14="http://schemas.microsoft.com/office/drawing/2010/main" val="0"/>
               </a:ext>
             </a:extLst>
           </a:blip>
@@ -14706,14 +14706,14 @@
           </a:ln>
           <a:extLst>
             <a:ext uri="{909E8E84-426E-40DD-AFC4-6F175D3DCCD1}">
-              <a14:hiddenFill xmlns:a14="http://schemas.microsoft.com/office/drawing/2010/main" xmlns="">
+              <a14:hiddenFill xmlns="" xmlns:a14="http://schemas.microsoft.com/office/drawing/2010/main">
                 <a:solidFill>
                   <a:srgbClr val="FFFFFF"/>
                 </a:solidFill>
               </a14:hiddenFill>
             </a:ext>
             <a:ext uri="{91240B29-F687-4F45-9708-019B960494DF}">
-              <a14:hiddenLine xmlns:a14="http://schemas.microsoft.com/office/drawing/2010/main" xmlns="" w="9525">
+              <a14:hiddenLine xmlns="" xmlns:a14="http://schemas.microsoft.com/office/drawing/2010/main" w="9525">
                 <a:solidFill>
                   <a:srgbClr val="000000"/>
                 </a:solidFill>
@@ -14911,7 +14911,7 @@
           <a:blip r:embed="rId2" cstate="print">
             <a:extLst>
               <a:ext uri="{28A0092B-C50C-407E-A947-70E740481C1C}">
-                <a14:useLocalDpi xmlns:a14="http://schemas.microsoft.com/office/drawing/2010/main" xmlns="" val="0"/>
+                <a14:useLocalDpi xmlns="" xmlns:a14="http://schemas.microsoft.com/office/drawing/2010/main" val="0"/>
               </a:ext>
             </a:extLst>
           </a:blip>
@@ -14934,14 +14934,14 @@
           </a:ln>
           <a:extLst>
             <a:ext uri="{909E8E84-426E-40DD-AFC4-6F175D3DCCD1}">
-              <a14:hiddenFill xmlns:a14="http://schemas.microsoft.com/office/drawing/2010/main" xmlns="">
+              <a14:hiddenFill xmlns="" xmlns:a14="http://schemas.microsoft.com/office/drawing/2010/main">
                 <a:solidFill>
                   <a:srgbClr val="FFFFFF"/>
                 </a:solidFill>
               </a14:hiddenFill>
             </a:ext>
             <a:ext uri="{91240B29-F687-4F45-9708-019B960494DF}">
-              <a14:hiddenLine xmlns:a14="http://schemas.microsoft.com/office/drawing/2010/main" xmlns="" w="9525">
+              <a14:hiddenLine xmlns="" xmlns:a14="http://schemas.microsoft.com/office/drawing/2010/main" w="9525">
                 <a:solidFill>
                   <a:srgbClr val="000000"/>
                 </a:solidFill>
@@ -15196,7 +15196,15 @@
           <a:p>
             <a:r>
               <a:rPr lang="en-US" dirty="0" smtClean="0"/>
-              <a:t>Write a small HTML/JS example, which as:</a:t>
+              <a:t>Write a small HTML/JS example, which </a:t>
+            </a:r>
+            <a:r>
+              <a:rPr lang="en-US" dirty="0" smtClean="0"/>
+              <a:t>has</a:t>
+            </a:r>
+            <a:r>
+              <a:rPr lang="en-US" dirty="0" smtClean="0"/>
+              <a:t>:</a:t>
             </a:r>
           </a:p>
           <a:p>
@@ -15292,25 +15300,6 @@
               <a:t>Answer</a:t>
             </a:r>
             <a:endParaRPr lang="en-US" dirty="0"/>
-          </a:p>
-        </p:txBody>
-      </p:sp>
-      <p:sp>
-        <p:nvSpPr>
-          <p:cNvPr id="3" name="Content Placeholder 2"/>
-          <p:cNvSpPr>
-            <a:spLocks noGrp="1"/>
-          </p:cNvSpPr>
-          <p:nvPr>
-            <p:ph idx="1"/>
-          </p:nvPr>
-        </p:nvSpPr>
-        <p:spPr/>
-        <p:txBody>
-          <a:bodyPr/>
-          <a:lstStyle/>
-          <a:p>
-            <a:endParaRPr lang="en-US"/>
           </a:p>
         </p:txBody>
       </p:sp>
@@ -15610,7 +15599,7 @@
           <a:blip r:embed="rId2" cstate="print">
             <a:extLst>
               <a:ext uri="{28A0092B-C50C-407E-A947-70E740481C1C}">
-                <a14:useLocalDpi xmlns:a14="http://schemas.microsoft.com/office/drawing/2010/main" xmlns="" val="0"/>
+                <a14:useLocalDpi xmlns="" xmlns:a14="http://schemas.microsoft.com/office/drawing/2010/main" val="0"/>
               </a:ext>
             </a:extLst>
           </a:blip>
@@ -15633,14 +15622,14 @@
           </a:ln>
           <a:extLst>
             <a:ext uri="{909E8E84-426E-40DD-AFC4-6F175D3DCCD1}">
-              <a14:hiddenFill xmlns:a14="http://schemas.microsoft.com/office/drawing/2010/main" xmlns="">
+              <a14:hiddenFill xmlns="" xmlns:a14="http://schemas.microsoft.com/office/drawing/2010/main">
                 <a:solidFill>
                   <a:srgbClr val="FFFFFF"/>
                 </a:solidFill>
               </a14:hiddenFill>
             </a:ext>
             <a:ext uri="{91240B29-F687-4F45-9708-019B960494DF}">
-              <a14:hiddenLine xmlns:a14="http://schemas.microsoft.com/office/drawing/2010/main" xmlns="" w="9525">
+              <a14:hiddenLine xmlns="" xmlns:a14="http://schemas.microsoft.com/office/drawing/2010/main" w="9525">
                 <a:solidFill>
                   <a:srgbClr val="000000"/>
                 </a:solidFill>
@@ -15664,7 +15653,7 @@
           <a:blip r:embed="rId3" cstate="print">
             <a:extLst>
               <a:ext uri="{28A0092B-C50C-407E-A947-70E740481C1C}">
-                <a14:useLocalDpi xmlns:a14="http://schemas.microsoft.com/office/drawing/2010/main" xmlns="" val="0"/>
+                <a14:useLocalDpi xmlns="" xmlns:a14="http://schemas.microsoft.com/office/drawing/2010/main" val="0"/>
               </a:ext>
             </a:extLst>
           </a:blip>
@@ -15687,14 +15676,14 @@
           </a:ln>
           <a:extLst>
             <a:ext uri="{909E8E84-426E-40DD-AFC4-6F175D3DCCD1}">
-              <a14:hiddenFill xmlns:a14="http://schemas.microsoft.com/office/drawing/2010/main" xmlns="">
+              <a14:hiddenFill xmlns="" xmlns:a14="http://schemas.microsoft.com/office/drawing/2010/main">
                 <a:solidFill>
                   <a:srgbClr val="FFFFFF"/>
                 </a:solidFill>
               </a14:hiddenFill>
             </a:ext>
             <a:ext uri="{91240B29-F687-4F45-9708-019B960494DF}">
-              <a14:hiddenLine xmlns:a14="http://schemas.microsoft.com/office/drawing/2010/main" xmlns="" w="9525">
+              <a14:hiddenLine xmlns="" xmlns:a14="http://schemas.microsoft.com/office/drawing/2010/main" w="9525">
                 <a:solidFill>
                   <a:srgbClr val="000000"/>
                 </a:solidFill>
@@ -15990,7 +15979,7 @@
     </p:spTree>
     <p:extLst>
       <p:ext uri="{BB962C8B-B14F-4D97-AF65-F5344CB8AC3E}">
-        <p14:creationId xmlns:p14="http://schemas.microsoft.com/office/powerpoint/2010/main" xmlns="" val="11439654"/>
+        <p14:creationId xmlns="" xmlns:p14="http://schemas.microsoft.com/office/powerpoint/2010/main" val="11439654"/>
       </p:ext>
     </p:extLst>
   </p:cSld>
@@ -16039,14 +16028,14 @@
           </a:ln>
           <a:extLst>
             <a:ext uri="{909E8E84-426E-40DD-AFC4-6F175D3DCCD1}">
-              <a14:hiddenFill xmlns:a14="http://schemas.microsoft.com/office/drawing/2010/main" xmlns="">
+              <a14:hiddenFill xmlns="" xmlns:a14="http://schemas.microsoft.com/office/drawing/2010/main">
                 <a:solidFill>
                   <a:srgbClr val="FFFFFF"/>
                 </a:solidFill>
               </a14:hiddenFill>
             </a:ext>
             <a:ext uri="{91240B29-F687-4F45-9708-019B960494DF}">
-              <a14:hiddenLine xmlns:a14="http://schemas.microsoft.com/office/drawing/2010/main" xmlns="" w="9525">
+              <a14:hiddenLine xmlns="" xmlns:a14="http://schemas.microsoft.com/office/drawing/2010/main" w="9525">
                 <a:solidFill>
                   <a:srgbClr val="000000"/>
                 </a:solidFill>
@@ -16319,14 +16308,14 @@
           </a:ln>
           <a:extLst>
             <a:ext uri="{909E8E84-426E-40DD-AFC4-6F175D3DCCD1}">
-              <a14:hiddenFill xmlns:a14="http://schemas.microsoft.com/office/drawing/2010/main" xmlns="">
+              <a14:hiddenFill xmlns="" xmlns:a14="http://schemas.microsoft.com/office/drawing/2010/main">
                 <a:solidFill>
                   <a:srgbClr val="FFFFFF"/>
                 </a:solidFill>
               </a14:hiddenFill>
             </a:ext>
             <a:ext uri="{91240B29-F687-4F45-9708-019B960494DF}">
-              <a14:hiddenLine xmlns:a14="http://schemas.microsoft.com/office/drawing/2010/main" xmlns="" w="9525">
+              <a14:hiddenLine xmlns="" xmlns:a14="http://schemas.microsoft.com/office/drawing/2010/main" w="9525">
                 <a:solidFill>
                   <a:srgbClr val="000000"/>
                 </a:solidFill>
@@ -16729,14 +16718,14 @@
           </a:ln>
           <a:extLst>
             <a:ext uri="{909E8E84-426E-40DD-AFC4-6F175D3DCCD1}">
-              <a14:hiddenFill xmlns:a14="http://schemas.microsoft.com/office/drawing/2010/main" xmlns="">
+              <a14:hiddenFill xmlns="" xmlns:a14="http://schemas.microsoft.com/office/drawing/2010/main">
                 <a:solidFill>
                   <a:srgbClr val="FFFFFF"/>
                 </a:solidFill>
               </a14:hiddenFill>
             </a:ext>
             <a:ext uri="{91240B29-F687-4F45-9708-019B960494DF}">
-              <a14:hiddenLine xmlns:a14="http://schemas.microsoft.com/office/drawing/2010/main" xmlns="" w="9525">
+              <a14:hiddenLine xmlns="" xmlns:a14="http://schemas.microsoft.com/office/drawing/2010/main" w="9525">
                 <a:solidFill>
                   <a:srgbClr val="000000"/>
                 </a:solidFill>
@@ -17009,14 +16998,14 @@
           </a:ln>
           <a:extLst>
             <a:ext uri="{909E8E84-426E-40DD-AFC4-6F175D3DCCD1}">
-              <a14:hiddenFill xmlns:a14="http://schemas.microsoft.com/office/drawing/2010/main" xmlns="">
+              <a14:hiddenFill xmlns="" xmlns:a14="http://schemas.microsoft.com/office/drawing/2010/main">
                 <a:solidFill>
                   <a:srgbClr val="FFFFFF"/>
                 </a:solidFill>
               </a14:hiddenFill>
             </a:ext>
             <a:ext uri="{91240B29-F687-4F45-9708-019B960494DF}">
-              <a14:hiddenLine xmlns:a14="http://schemas.microsoft.com/office/drawing/2010/main" xmlns="" w="9525">
+              <a14:hiddenLine xmlns="" xmlns:a14="http://schemas.microsoft.com/office/drawing/2010/main" w="9525">
                 <a:solidFill>
                   <a:srgbClr val="000000"/>
                 </a:solidFill>
@@ -17776,14 +17765,14 @@
           </a:ln>
           <a:extLst>
             <a:ext uri="{909E8E84-426E-40DD-AFC4-6F175D3DCCD1}">
-              <a14:hiddenFill xmlns:a14="http://schemas.microsoft.com/office/drawing/2010/main" xmlns="">
+              <a14:hiddenFill xmlns="" xmlns:a14="http://schemas.microsoft.com/office/drawing/2010/main">
                 <a:solidFill>
                   <a:srgbClr val="FFFFFF"/>
                 </a:solidFill>
               </a14:hiddenFill>
             </a:ext>
             <a:ext uri="{91240B29-F687-4F45-9708-019B960494DF}">
-              <a14:hiddenLine xmlns:a14="http://schemas.microsoft.com/office/drawing/2010/main" xmlns="" w="9525">
+              <a14:hiddenLine xmlns="" xmlns:a14="http://schemas.microsoft.com/office/drawing/2010/main" w="9525">
                 <a:solidFill>
                   <a:srgbClr val="000000"/>
                 </a:solidFill>
@@ -18056,14 +18045,14 @@
           </a:ln>
           <a:extLst>
             <a:ext uri="{909E8E84-426E-40DD-AFC4-6F175D3DCCD1}">
-              <a14:hiddenFill xmlns:a14="http://schemas.microsoft.com/office/drawing/2010/main" xmlns="">
+              <a14:hiddenFill xmlns="" xmlns:a14="http://schemas.microsoft.com/office/drawing/2010/main">
                 <a:solidFill>
                   <a:srgbClr val="FFFFFF"/>
                 </a:solidFill>
               </a14:hiddenFill>
             </a:ext>
             <a:ext uri="{91240B29-F687-4F45-9708-019B960494DF}">
-              <a14:hiddenLine xmlns:a14="http://schemas.microsoft.com/office/drawing/2010/main" xmlns="" w="9525">
+              <a14:hiddenLine xmlns="" xmlns:a14="http://schemas.microsoft.com/office/drawing/2010/main" w="9525">
                 <a:solidFill>
                   <a:srgbClr val="000000"/>
                 </a:solidFill>
@@ -18378,14 +18367,14 @@
           </a:ln>
           <a:extLst>
             <a:ext uri="{909E8E84-426E-40DD-AFC4-6F175D3DCCD1}">
-              <a14:hiddenFill xmlns:a14="http://schemas.microsoft.com/office/drawing/2010/main" xmlns="">
+              <a14:hiddenFill xmlns="" xmlns:a14="http://schemas.microsoft.com/office/drawing/2010/main">
                 <a:solidFill>
                   <a:srgbClr val="FFFFFF"/>
                 </a:solidFill>
               </a14:hiddenFill>
             </a:ext>
             <a:ext uri="{91240B29-F687-4F45-9708-019B960494DF}">
-              <a14:hiddenLine xmlns:a14="http://schemas.microsoft.com/office/drawing/2010/main" xmlns="" w="9525">
+              <a14:hiddenLine xmlns="" xmlns:a14="http://schemas.microsoft.com/office/drawing/2010/main" w="9525">
                 <a:solidFill>
                   <a:srgbClr val="000000"/>
                 </a:solidFill>
@@ -18658,14 +18647,14 @@
           </a:ln>
           <a:extLst>
             <a:ext uri="{909E8E84-426E-40DD-AFC4-6F175D3DCCD1}">
-              <a14:hiddenFill xmlns:a14="http://schemas.microsoft.com/office/drawing/2010/main" xmlns="">
+              <a14:hiddenFill xmlns="" xmlns:a14="http://schemas.microsoft.com/office/drawing/2010/main">
                 <a:solidFill>
                   <a:srgbClr val="FFFFFF"/>
                 </a:solidFill>
               </a14:hiddenFill>
             </a:ext>
             <a:ext uri="{91240B29-F687-4F45-9708-019B960494DF}">
-              <a14:hiddenLine xmlns:a14="http://schemas.microsoft.com/office/drawing/2010/main" xmlns="" w="9525">
+              <a14:hiddenLine xmlns="" xmlns:a14="http://schemas.microsoft.com/office/drawing/2010/main" w="9525">
                 <a:solidFill>
                   <a:srgbClr val="000000"/>
                 </a:solidFill>
@@ -18793,7 +18782,7 @@
           <a:blip r:embed="rId3" cstate="print">
             <a:extLst>
               <a:ext uri="{28A0092B-C50C-407E-A947-70E740481C1C}">
-                <a14:useLocalDpi xmlns:a14="http://schemas.microsoft.com/office/drawing/2010/main" xmlns="" val="0"/>
+                <a14:useLocalDpi xmlns="" xmlns:a14="http://schemas.microsoft.com/office/drawing/2010/main" val="0"/>
               </a:ext>
             </a:extLst>
           </a:blip>
@@ -18816,14 +18805,14 @@
           </a:ln>
           <a:extLst>
             <a:ext uri="{909E8E84-426E-40DD-AFC4-6F175D3DCCD1}">
-              <a14:hiddenFill xmlns:a14="http://schemas.microsoft.com/office/drawing/2010/main" xmlns="">
+              <a14:hiddenFill xmlns="" xmlns:a14="http://schemas.microsoft.com/office/drawing/2010/main">
                 <a:solidFill>
                   <a:srgbClr val="FFFFFF"/>
                 </a:solidFill>
               </a14:hiddenFill>
             </a:ext>
             <a:ext uri="{91240B29-F687-4F45-9708-019B960494DF}">
-              <a14:hiddenLine xmlns:a14="http://schemas.microsoft.com/office/drawing/2010/main" xmlns="" w="9525">
+              <a14:hiddenLine xmlns="" xmlns:a14="http://schemas.microsoft.com/office/drawing/2010/main" w="9525">
                 <a:solidFill>
                   <a:srgbClr val="000000"/>
                 </a:solidFill>
@@ -18900,7 +18889,7 @@
           <a:blip r:embed="rId2" cstate="print">
             <a:extLst>
               <a:ext uri="{28A0092B-C50C-407E-A947-70E740481C1C}">
-                <a14:useLocalDpi xmlns:a14="http://schemas.microsoft.com/office/drawing/2010/main" xmlns="" val="0"/>
+                <a14:useLocalDpi xmlns="" xmlns:a14="http://schemas.microsoft.com/office/drawing/2010/main" val="0"/>
               </a:ext>
             </a:extLst>
           </a:blip>
@@ -18923,14 +18912,14 @@
           </a:ln>
           <a:extLst>
             <a:ext uri="{909E8E84-426E-40DD-AFC4-6F175D3DCCD1}">
-              <a14:hiddenFill xmlns:a14="http://schemas.microsoft.com/office/drawing/2010/main" xmlns="">
+              <a14:hiddenFill xmlns="" xmlns:a14="http://schemas.microsoft.com/office/drawing/2010/main">
                 <a:solidFill>
                   <a:srgbClr val="FFFFFF"/>
                 </a:solidFill>
               </a14:hiddenFill>
             </a:ext>
             <a:ext uri="{91240B29-F687-4F45-9708-019B960494DF}">
-              <a14:hiddenLine xmlns:a14="http://schemas.microsoft.com/office/drawing/2010/main" xmlns="" w="9525">
+              <a14:hiddenLine xmlns="" xmlns:a14="http://schemas.microsoft.com/office/drawing/2010/main" w="9525">
                 <a:solidFill>
                   <a:srgbClr val="000000"/>
                 </a:solidFill>
@@ -19532,7 +19521,7 @@
           <a:blip r:embed="rId3" cstate="print">
             <a:extLst>
               <a:ext uri="{28A0092B-C50C-407E-A947-70E740481C1C}">
-                <a14:useLocalDpi xmlns:a14="http://schemas.microsoft.com/office/drawing/2010/main" xmlns="" val="0"/>
+                <a14:useLocalDpi xmlns="" xmlns:a14="http://schemas.microsoft.com/office/drawing/2010/main" val="0"/>
               </a:ext>
             </a:extLst>
           </a:blip>
@@ -19555,14 +19544,14 @@
           </a:ln>
           <a:extLst>
             <a:ext uri="{909E8E84-426E-40DD-AFC4-6F175D3DCCD1}">
-              <a14:hiddenFill xmlns:a14="http://schemas.microsoft.com/office/drawing/2010/main" xmlns="">
+              <a14:hiddenFill xmlns="" xmlns:a14="http://schemas.microsoft.com/office/drawing/2010/main">
                 <a:solidFill>
                   <a:srgbClr val="FFFFFF"/>
                 </a:solidFill>
               </a14:hiddenFill>
             </a:ext>
             <a:ext uri="{91240B29-F687-4F45-9708-019B960494DF}">
-              <a14:hiddenLine xmlns:a14="http://schemas.microsoft.com/office/drawing/2010/main" xmlns="" w="9525">
+              <a14:hiddenLine xmlns="" xmlns:a14="http://schemas.microsoft.com/office/drawing/2010/main" w="9525">
                 <a:solidFill>
                   <a:srgbClr val="000000"/>
                 </a:solidFill>
@@ -20072,7 +20061,7 @@
   </a:extraClrSchemeLst>
   <a:extLst>
     <a:ext uri="{05A4C25C-085E-4340-85A3-A5531E510DB2}">
-      <thm15:themeFamily xmlns:thm15="http://schemas.microsoft.com/office/thememl/2012/main" xmlns="" name="Office Theme" id="{62F939B6-93AF-4DB8-9C6B-D6C7DFDC589F}" vid="{4A3C46E8-61CC-4603-A589-7422A47A8E4A}"/>
+      <thm15:themeFamily xmlns="" xmlns:thm15="http://schemas.microsoft.com/office/thememl/2012/main" name="Office Theme" id="{62F939B6-93AF-4DB8-9C6B-D6C7DFDC589F}" vid="{4A3C46E8-61CC-4603-A589-7422A47A8E4A}"/>
     </a:ext>
   </a:extLst>
 </a:theme>
@@ -20333,7 +20322,7 @@
   <a:extraClrSchemeLst/>
   <a:extLst>
     <a:ext uri="{05A4C25C-085E-4340-85A3-A5531E510DB2}">
-      <thm15:themeFamily xmlns:thm15="http://schemas.microsoft.com/office/thememl/2012/main" xmlns="" name="Office Theme" id="{62F939B6-93AF-4DB8-9C6B-D6C7DFDC589F}" vid="{4A3C46E8-61CC-4603-A589-7422A47A8E4A}"/>
+      <thm15:themeFamily xmlns="" xmlns:thm15="http://schemas.microsoft.com/office/thememl/2012/main" name="Office Theme" id="{62F939B6-93AF-4DB8-9C6B-D6C7DFDC589F}" vid="{4A3C46E8-61CC-4603-A589-7422A47A8E4A}"/>
     </a:ext>
   </a:extLst>
 </a:theme>

</xml_diff>